<commit_message>
add results basis and correlation
</commit_message>
<xml_diff>
--- a/Ramsey.pptx
+++ b/Ramsey.pptx
@@ -6,6 +6,7 @@
   </p:sldMasterIdLst>
   <p:sldIdLst>
     <p:sldId id="256" r:id="rId2"/>
+    <p:sldId id="257" r:id="rId3"/>
   </p:sldIdLst>
   <p:sldSz cx="12192000" cy="6858000"/>
   <p:notesSz cx="6858000" cy="9144000"/>
@@ -261,7 +262,7 @@
           <a:p>
             <a:fld id="{B382F998-7310-5B45-9BC8-77489E3441D9}" type="datetimeFigureOut">
               <a:rPr lang="en-DE" smtClean="0"/>
-              <a:t>03/03/2021</a:t>
+              <a:t>03/15/2021</a:t>
             </a:fld>
             <a:endParaRPr lang="en-DE"/>
           </a:p>
@@ -461,7 +462,7 @@
           <a:p>
             <a:fld id="{B382F998-7310-5B45-9BC8-77489E3441D9}" type="datetimeFigureOut">
               <a:rPr lang="en-DE" smtClean="0"/>
-              <a:t>03/03/2021</a:t>
+              <a:t>03/15/2021</a:t>
             </a:fld>
             <a:endParaRPr lang="en-DE"/>
           </a:p>
@@ -671,7 +672,7 @@
           <a:p>
             <a:fld id="{B382F998-7310-5B45-9BC8-77489E3441D9}" type="datetimeFigureOut">
               <a:rPr lang="en-DE" smtClean="0"/>
-              <a:t>03/03/2021</a:t>
+              <a:t>03/15/2021</a:t>
             </a:fld>
             <a:endParaRPr lang="en-DE"/>
           </a:p>
@@ -871,7 +872,7 @@
           <a:p>
             <a:fld id="{B382F998-7310-5B45-9BC8-77489E3441D9}" type="datetimeFigureOut">
               <a:rPr lang="en-DE" smtClean="0"/>
-              <a:t>03/03/2021</a:t>
+              <a:t>03/15/2021</a:t>
             </a:fld>
             <a:endParaRPr lang="en-DE"/>
           </a:p>
@@ -1147,7 +1148,7 @@
           <a:p>
             <a:fld id="{B382F998-7310-5B45-9BC8-77489E3441D9}" type="datetimeFigureOut">
               <a:rPr lang="en-DE" smtClean="0"/>
-              <a:t>03/03/2021</a:t>
+              <a:t>03/15/2021</a:t>
             </a:fld>
             <a:endParaRPr lang="en-DE"/>
           </a:p>
@@ -1415,7 +1416,7 @@
           <a:p>
             <a:fld id="{B382F998-7310-5B45-9BC8-77489E3441D9}" type="datetimeFigureOut">
               <a:rPr lang="en-DE" smtClean="0"/>
-              <a:t>03/03/2021</a:t>
+              <a:t>03/15/2021</a:t>
             </a:fld>
             <a:endParaRPr lang="en-DE"/>
           </a:p>
@@ -1830,7 +1831,7 @@
           <a:p>
             <a:fld id="{B382F998-7310-5B45-9BC8-77489E3441D9}" type="datetimeFigureOut">
               <a:rPr lang="en-DE" smtClean="0"/>
-              <a:t>03/03/2021</a:t>
+              <a:t>03/15/2021</a:t>
             </a:fld>
             <a:endParaRPr lang="en-DE"/>
           </a:p>
@@ -1972,7 +1973,7 @@
           <a:p>
             <a:fld id="{B382F998-7310-5B45-9BC8-77489E3441D9}" type="datetimeFigureOut">
               <a:rPr lang="en-DE" smtClean="0"/>
-              <a:t>03/03/2021</a:t>
+              <a:t>03/15/2021</a:t>
             </a:fld>
             <a:endParaRPr lang="en-DE"/>
           </a:p>
@@ -2085,7 +2086,7 @@
           <a:p>
             <a:fld id="{B382F998-7310-5B45-9BC8-77489E3441D9}" type="datetimeFigureOut">
               <a:rPr lang="en-DE" smtClean="0"/>
-              <a:t>03/03/2021</a:t>
+              <a:t>03/15/2021</a:t>
             </a:fld>
             <a:endParaRPr lang="en-DE"/>
           </a:p>
@@ -2398,7 +2399,7 @@
           <a:p>
             <a:fld id="{B382F998-7310-5B45-9BC8-77489E3441D9}" type="datetimeFigureOut">
               <a:rPr lang="en-DE" smtClean="0"/>
-              <a:t>03/03/2021</a:t>
+              <a:t>03/15/2021</a:t>
             </a:fld>
             <a:endParaRPr lang="en-DE"/>
           </a:p>
@@ -2687,7 +2688,7 @@
           <a:p>
             <a:fld id="{B382F998-7310-5B45-9BC8-77489E3441D9}" type="datetimeFigureOut">
               <a:rPr lang="en-DE" smtClean="0"/>
-              <a:t>03/03/2021</a:t>
+              <a:t>03/15/2021</a:t>
             </a:fld>
             <a:endParaRPr lang="en-DE"/>
           </a:p>
@@ -2930,7 +2931,7 @@
           <a:p>
             <a:fld id="{B382F998-7310-5B45-9BC8-77489E3441D9}" type="datetimeFigureOut">
               <a:rPr lang="en-DE" smtClean="0"/>
-              <a:t>03/03/2021</a:t>
+              <a:t>03/15/2021</a:t>
             </a:fld>
             <a:endParaRPr lang="en-DE"/>
           </a:p>
@@ -5223,8 +5224,8 @@
           </p:sp>
         </mc:Fallback>
       </mc:AlternateContent>
-      <mc:AlternateContent xmlns:mc="http://schemas.openxmlformats.org/markup-compatibility/2006">
-        <mc:Choice xmlns:a14="http://schemas.microsoft.com/office/drawing/2010/main" Requires="a14">
+      <mc:AlternateContent xmlns:mc="http://schemas.openxmlformats.org/markup-compatibility/2006" xmlns:a14="http://schemas.microsoft.com/office/drawing/2010/main">
+        <mc:Choice Requires="a14">
           <p:sp>
             <p:nvSpPr>
               <p:cNvPr id="31" name="TextBox 30">
@@ -5360,7 +5361,7 @@
             </p:txBody>
           </p:sp>
         </mc:Choice>
-        <mc:Fallback>
+        <mc:Fallback xmlns="">
           <p:sp>
             <p:nvSpPr>
               <p:cNvPr id="31" name="TextBox 30">
@@ -5409,6 +5410,2788 @@
     <p:extLst>
       <p:ext uri="{BB962C8B-B14F-4D97-AF65-F5344CB8AC3E}">
         <p14:creationId xmlns:p14="http://schemas.microsoft.com/office/powerpoint/2010/main" val="147311096"/>
+      </p:ext>
+    </p:extLst>
+  </p:cSld>
+  <p:clrMapOvr>
+    <a:masterClrMapping/>
+  </p:clrMapOvr>
+</p:sld>
+</file>
+
+<file path=ppt/slides/slide2.xml><?xml version="1.0" encoding="utf-8"?>
+<p:sld xmlns:a="http://schemas.openxmlformats.org/drawingml/2006/main" xmlns:r="http://schemas.openxmlformats.org/officeDocument/2006/relationships" xmlns:p="http://schemas.openxmlformats.org/presentationml/2006/main">
+  <p:cSld>
+    <p:spTree>
+      <p:nvGrpSpPr>
+        <p:cNvPr id="1" name=""/>
+        <p:cNvGrpSpPr/>
+        <p:nvPr/>
+      </p:nvGrpSpPr>
+      <p:grpSpPr>
+        <a:xfrm>
+          <a:off x="0" y="0"/>
+          <a:ext cx="0" cy="0"/>
+          <a:chOff x="0" y="0"/>
+          <a:chExt cx="0" cy="0"/>
+        </a:xfrm>
+      </p:grpSpPr>
+      <p:grpSp>
+        <p:nvGrpSpPr>
+          <p:cNvPr id="75" name="Group 74"/>
+          <p:cNvGrpSpPr/>
+          <p:nvPr/>
+        </p:nvGrpSpPr>
+        <p:grpSpPr>
+          <a:xfrm>
+            <a:off x="4137472" y="186296"/>
+            <a:ext cx="3323460" cy="1732703"/>
+            <a:chOff x="3454405" y="103083"/>
+            <a:chExt cx="3323460" cy="1732703"/>
+          </a:xfrm>
+        </p:grpSpPr>
+        <p:sp>
+          <p:nvSpPr>
+            <p:cNvPr id="55" name="Oval 54">
+              <a:extLst>
+                <a:ext uri="{FF2B5EF4-FFF2-40B4-BE49-F238E27FC236}">
+                  <a16:creationId xmlns:a16="http://schemas.microsoft.com/office/drawing/2014/main" id="{C7CA7E8B-A0EF-424D-977E-A06A75DE837D}"/>
+                </a:ext>
+              </a:extLst>
+            </p:cNvPr>
+            <p:cNvSpPr/>
+            <p:nvPr/>
+          </p:nvSpPr>
+          <p:spPr>
+            <a:xfrm>
+              <a:off x="4006443" y="836077"/>
+              <a:ext cx="406400" cy="406400"/>
+            </a:xfrm>
+            <a:prstGeom prst="ellipse">
+              <a:avLst/>
+            </a:prstGeom>
+            <a:solidFill>
+              <a:schemeClr val="bg1">
+                <a:lumMod val="65000"/>
+              </a:schemeClr>
+            </a:solidFill>
+            <a:ln>
+              <a:noFill/>
+            </a:ln>
+          </p:spPr>
+          <p:style>
+            <a:lnRef idx="2">
+              <a:schemeClr val="accent1">
+                <a:shade val="50000"/>
+              </a:schemeClr>
+            </a:lnRef>
+            <a:fillRef idx="1">
+              <a:schemeClr val="accent1"/>
+            </a:fillRef>
+            <a:effectRef idx="0">
+              <a:schemeClr val="accent1"/>
+            </a:effectRef>
+            <a:fontRef idx="minor">
+              <a:schemeClr val="lt1"/>
+            </a:fontRef>
+          </p:style>
+          <p:txBody>
+            <a:bodyPr rtlCol="0" anchor="ctr"/>
+            <a:lstStyle/>
+            <a:p>
+              <a:pPr algn="ctr"/>
+              <a:endParaRPr lang="en-DE"/>
+            </a:p>
+          </p:txBody>
+        </p:sp>
+        <p:sp>
+          <p:nvSpPr>
+            <p:cNvPr id="56" name="Oval 55">
+              <a:extLst>
+                <a:ext uri="{FF2B5EF4-FFF2-40B4-BE49-F238E27FC236}">
+                  <a16:creationId xmlns:a16="http://schemas.microsoft.com/office/drawing/2014/main" id="{D42037DF-EE40-A748-B850-E38A24E22E82}"/>
+                </a:ext>
+              </a:extLst>
+            </p:cNvPr>
+            <p:cNvSpPr/>
+            <p:nvPr/>
+          </p:nvSpPr>
+          <p:spPr>
+            <a:xfrm>
+              <a:off x="4791021" y="836077"/>
+              <a:ext cx="406400" cy="406400"/>
+            </a:xfrm>
+            <a:prstGeom prst="ellipse">
+              <a:avLst/>
+            </a:prstGeom>
+            <a:solidFill>
+              <a:schemeClr val="bg1">
+                <a:lumMod val="65000"/>
+              </a:schemeClr>
+            </a:solidFill>
+            <a:ln>
+              <a:noFill/>
+            </a:ln>
+          </p:spPr>
+          <p:style>
+            <a:lnRef idx="2">
+              <a:schemeClr val="accent1">
+                <a:shade val="50000"/>
+              </a:schemeClr>
+            </a:lnRef>
+            <a:fillRef idx="1">
+              <a:schemeClr val="accent1"/>
+            </a:fillRef>
+            <a:effectRef idx="0">
+              <a:schemeClr val="accent1"/>
+            </a:effectRef>
+            <a:fontRef idx="minor">
+              <a:schemeClr val="lt1"/>
+            </a:fontRef>
+          </p:style>
+          <p:txBody>
+            <a:bodyPr rtlCol="0" anchor="ctr"/>
+            <a:lstStyle/>
+            <a:p>
+              <a:pPr algn="ctr"/>
+              <a:endParaRPr lang="en-DE"/>
+            </a:p>
+          </p:txBody>
+        </p:sp>
+        <p:sp>
+          <p:nvSpPr>
+            <p:cNvPr id="57" name="Oval 56">
+              <a:extLst>
+                <a:ext uri="{FF2B5EF4-FFF2-40B4-BE49-F238E27FC236}">
+                  <a16:creationId xmlns:a16="http://schemas.microsoft.com/office/drawing/2014/main" id="{6BFA0615-4A31-F049-87FF-2B9688FC0CEC}"/>
+                </a:ext>
+              </a:extLst>
+            </p:cNvPr>
+            <p:cNvSpPr/>
+            <p:nvPr/>
+          </p:nvSpPr>
+          <p:spPr>
+            <a:xfrm>
+              <a:off x="5581243" y="836077"/>
+              <a:ext cx="406400" cy="406400"/>
+            </a:xfrm>
+            <a:prstGeom prst="ellipse">
+              <a:avLst/>
+            </a:prstGeom>
+            <a:solidFill>
+              <a:schemeClr val="bg1">
+                <a:lumMod val="65000"/>
+              </a:schemeClr>
+            </a:solidFill>
+            <a:ln>
+              <a:noFill/>
+            </a:ln>
+          </p:spPr>
+          <p:style>
+            <a:lnRef idx="2">
+              <a:schemeClr val="accent1">
+                <a:shade val="50000"/>
+              </a:schemeClr>
+            </a:lnRef>
+            <a:fillRef idx="1">
+              <a:schemeClr val="accent1"/>
+            </a:fillRef>
+            <a:effectRef idx="0">
+              <a:schemeClr val="accent1"/>
+            </a:effectRef>
+            <a:fontRef idx="minor">
+              <a:schemeClr val="lt1"/>
+            </a:fontRef>
+          </p:style>
+          <p:txBody>
+            <a:bodyPr rtlCol="0" anchor="ctr"/>
+            <a:lstStyle/>
+            <a:p>
+              <a:pPr algn="ctr"/>
+              <a:endParaRPr lang="en-DE"/>
+            </a:p>
+          </p:txBody>
+        </p:sp>
+        <p:sp>
+          <p:nvSpPr>
+            <p:cNvPr id="58" name="Oval 57">
+              <a:extLst>
+                <a:ext uri="{FF2B5EF4-FFF2-40B4-BE49-F238E27FC236}">
+                  <a16:creationId xmlns:a16="http://schemas.microsoft.com/office/drawing/2014/main" id="{19CB9FEA-CECC-4141-AD42-68740712D151}"/>
+                </a:ext>
+              </a:extLst>
+            </p:cNvPr>
+            <p:cNvSpPr/>
+            <p:nvPr/>
+          </p:nvSpPr>
+          <p:spPr>
+            <a:xfrm>
+              <a:off x="6371465" y="836077"/>
+              <a:ext cx="406400" cy="406400"/>
+            </a:xfrm>
+            <a:prstGeom prst="ellipse">
+              <a:avLst/>
+            </a:prstGeom>
+            <a:solidFill>
+              <a:schemeClr val="bg1">
+                <a:lumMod val="65000"/>
+              </a:schemeClr>
+            </a:solidFill>
+            <a:ln>
+              <a:noFill/>
+            </a:ln>
+          </p:spPr>
+          <p:style>
+            <a:lnRef idx="2">
+              <a:schemeClr val="accent1">
+                <a:shade val="50000"/>
+              </a:schemeClr>
+            </a:lnRef>
+            <a:fillRef idx="1">
+              <a:schemeClr val="accent1"/>
+            </a:fillRef>
+            <a:effectRef idx="0">
+              <a:schemeClr val="accent1"/>
+            </a:effectRef>
+            <a:fontRef idx="minor">
+              <a:schemeClr val="lt1"/>
+            </a:fontRef>
+          </p:style>
+          <p:txBody>
+            <a:bodyPr rtlCol="0" anchor="ctr"/>
+            <a:lstStyle/>
+            <a:p>
+              <a:pPr algn="ctr"/>
+              <a:endParaRPr lang="en-DE"/>
+            </a:p>
+          </p:txBody>
+        </p:sp>
+        <p:sp>
+          <p:nvSpPr>
+            <p:cNvPr id="61" name="TextBox 60"/>
+            <p:cNvSpPr txBox="1"/>
+            <p:nvPr/>
+          </p:nvSpPr>
+          <p:spPr>
+            <a:xfrm>
+              <a:off x="4058800" y="865645"/>
+              <a:ext cx="301686" cy="369332"/>
+            </a:xfrm>
+            <a:prstGeom prst="rect">
+              <a:avLst/>
+            </a:prstGeom>
+            <a:noFill/>
+          </p:spPr>
+          <p:txBody>
+            <a:bodyPr wrap="none" rtlCol="0">
+              <a:spAutoFit/>
+            </a:bodyPr>
+            <a:lstStyle/>
+            <a:p>
+              <a:r>
+                <a:rPr lang="en-US" dirty="0" smtClean="0"/>
+                <a:t>0</a:t>
+              </a:r>
+              <a:endParaRPr lang="en-US" dirty="0"/>
+            </a:p>
+          </p:txBody>
+        </p:sp>
+        <p:sp>
+          <p:nvSpPr>
+            <p:cNvPr id="62" name="TextBox 61"/>
+            <p:cNvSpPr txBox="1"/>
+            <p:nvPr/>
+          </p:nvSpPr>
+          <p:spPr>
+            <a:xfrm>
+              <a:off x="4843378" y="854611"/>
+              <a:ext cx="301686" cy="369332"/>
+            </a:xfrm>
+            <a:prstGeom prst="rect">
+              <a:avLst/>
+            </a:prstGeom>
+            <a:noFill/>
+          </p:spPr>
+          <p:txBody>
+            <a:bodyPr wrap="none" rtlCol="0">
+              <a:spAutoFit/>
+            </a:bodyPr>
+            <a:lstStyle/>
+            <a:p>
+              <a:r>
+                <a:rPr lang="en-US" dirty="0" smtClean="0"/>
+                <a:t>1</a:t>
+              </a:r>
+              <a:endParaRPr lang="en-US" dirty="0"/>
+            </a:p>
+          </p:txBody>
+        </p:sp>
+        <p:sp>
+          <p:nvSpPr>
+            <p:cNvPr id="63" name="TextBox 62"/>
+            <p:cNvSpPr txBox="1"/>
+            <p:nvPr/>
+          </p:nvSpPr>
+          <p:spPr>
+            <a:xfrm>
+              <a:off x="5636996" y="847111"/>
+              <a:ext cx="301686" cy="369332"/>
+            </a:xfrm>
+            <a:prstGeom prst="rect">
+              <a:avLst/>
+            </a:prstGeom>
+            <a:noFill/>
+          </p:spPr>
+          <p:txBody>
+            <a:bodyPr wrap="none" rtlCol="0">
+              <a:spAutoFit/>
+            </a:bodyPr>
+            <a:lstStyle/>
+            <a:p>
+              <a:r>
+                <a:rPr lang="en-US" dirty="0" smtClean="0"/>
+                <a:t>2</a:t>
+              </a:r>
+              <a:endParaRPr lang="en-US" dirty="0"/>
+            </a:p>
+          </p:txBody>
+        </p:sp>
+        <p:sp>
+          <p:nvSpPr>
+            <p:cNvPr id="64" name="TextBox 63"/>
+            <p:cNvSpPr txBox="1"/>
+            <p:nvPr/>
+          </p:nvSpPr>
+          <p:spPr>
+            <a:xfrm>
+              <a:off x="6423822" y="847111"/>
+              <a:ext cx="301686" cy="369332"/>
+            </a:xfrm>
+            <a:prstGeom prst="rect">
+              <a:avLst/>
+            </a:prstGeom>
+            <a:noFill/>
+          </p:spPr>
+          <p:txBody>
+            <a:bodyPr wrap="none" rtlCol="0">
+              <a:spAutoFit/>
+            </a:bodyPr>
+            <a:lstStyle/>
+            <a:p>
+              <a:r>
+                <a:rPr lang="en-US" dirty="0" smtClean="0"/>
+                <a:t>3</a:t>
+              </a:r>
+              <a:endParaRPr lang="en-US" dirty="0"/>
+            </a:p>
+          </p:txBody>
+        </p:sp>
+        <p:sp>
+          <p:nvSpPr>
+            <p:cNvPr id="67" name="Right Brace 66"/>
+            <p:cNvSpPr/>
+            <p:nvPr/>
+          </p:nvSpPr>
+          <p:spPr>
+            <a:xfrm rot="5400000">
+              <a:off x="5308380" y="1019099"/>
+              <a:ext cx="194390" cy="825390"/>
+            </a:xfrm>
+            <a:prstGeom prst="rightBrace">
+              <a:avLst>
+                <a:gd name="adj1" fmla="val 36253"/>
+                <a:gd name="adj2" fmla="val 50000"/>
+              </a:avLst>
+            </a:prstGeom>
+          </p:spPr>
+          <p:style>
+            <a:lnRef idx="1">
+              <a:schemeClr val="accent1"/>
+            </a:lnRef>
+            <a:fillRef idx="0">
+              <a:schemeClr val="accent1"/>
+            </a:fillRef>
+            <a:effectRef idx="0">
+              <a:schemeClr val="accent1"/>
+            </a:effectRef>
+            <a:fontRef idx="minor">
+              <a:schemeClr val="tx1"/>
+            </a:fontRef>
+          </p:style>
+          <p:txBody>
+            <a:bodyPr rtlCol="0" anchor="ctr"/>
+            <a:lstStyle/>
+            <a:p>
+              <a:pPr algn="ctr"/>
+              <a:endParaRPr lang="en-US"/>
+            </a:p>
+          </p:txBody>
+        </p:sp>
+        <p:sp>
+          <p:nvSpPr>
+            <p:cNvPr id="68" name="TextBox 67"/>
+            <p:cNvSpPr txBox="1"/>
+            <p:nvPr/>
+          </p:nvSpPr>
+          <p:spPr>
+            <a:xfrm>
+              <a:off x="4992881" y="1558787"/>
+              <a:ext cx="926857" cy="276999"/>
+            </a:xfrm>
+            <a:prstGeom prst="rect">
+              <a:avLst/>
+            </a:prstGeom>
+            <a:noFill/>
+          </p:spPr>
+          <p:txBody>
+            <a:bodyPr wrap="none" rtlCol="0">
+              <a:spAutoFit/>
+            </a:bodyPr>
+            <a:lstStyle/>
+            <a:p>
+              <a:r>
+                <a:rPr lang="en-US" sz="1200" b="1" dirty="0" smtClean="0"/>
+                <a:t>Middle pair</a:t>
+              </a:r>
+              <a:endParaRPr lang="en-US" sz="1200" b="1" dirty="0"/>
+            </a:p>
+          </p:txBody>
+        </p:sp>
+        <p:sp>
+          <p:nvSpPr>
+            <p:cNvPr id="69" name="Right Brace 68"/>
+            <p:cNvSpPr/>
+            <p:nvPr/>
+          </p:nvSpPr>
+          <p:spPr>
+            <a:xfrm rot="16200000">
+              <a:off x="5200634" y="-611834"/>
+              <a:ext cx="350392" cy="2373906"/>
+            </a:xfrm>
+            <a:prstGeom prst="rightBrace">
+              <a:avLst/>
+            </a:prstGeom>
+          </p:spPr>
+          <p:style>
+            <a:lnRef idx="1">
+              <a:schemeClr val="accent1"/>
+            </a:lnRef>
+            <a:fillRef idx="0">
+              <a:schemeClr val="accent1"/>
+            </a:fillRef>
+            <a:effectRef idx="0">
+              <a:schemeClr val="accent1"/>
+            </a:effectRef>
+            <a:fontRef idx="minor">
+              <a:schemeClr val="tx1"/>
+            </a:fontRef>
+          </p:style>
+          <p:txBody>
+            <a:bodyPr rtlCol="0" anchor="ctr"/>
+            <a:lstStyle/>
+            <a:p>
+              <a:pPr algn="ctr"/>
+              <a:endParaRPr lang="en-US"/>
+            </a:p>
+          </p:txBody>
+        </p:sp>
+        <p:sp>
+          <p:nvSpPr>
+            <p:cNvPr id="70" name="TextBox 69"/>
+            <p:cNvSpPr txBox="1"/>
+            <p:nvPr/>
+          </p:nvSpPr>
+          <p:spPr>
+            <a:xfrm>
+              <a:off x="4841632" y="103083"/>
+              <a:ext cx="1128579" cy="276999"/>
+            </a:xfrm>
+            <a:prstGeom prst="rect">
+              <a:avLst/>
+            </a:prstGeom>
+            <a:noFill/>
+          </p:spPr>
+          <p:txBody>
+            <a:bodyPr wrap="none" rtlCol="0">
+              <a:spAutoFit/>
+            </a:bodyPr>
+            <a:lstStyle/>
+            <a:p>
+              <a:r>
+                <a:rPr lang="en-US" sz="1200" b="1" dirty="0" smtClean="0"/>
+                <a:t>Projection pair</a:t>
+              </a:r>
+              <a:endParaRPr lang="en-US" sz="1200" b="1" dirty="0"/>
+            </a:p>
+          </p:txBody>
+        </p:sp>
+        <p:sp>
+          <p:nvSpPr>
+            <p:cNvPr id="71" name="TextBox 70"/>
+            <p:cNvSpPr txBox="1"/>
+            <p:nvPr/>
+          </p:nvSpPr>
+          <p:spPr>
+            <a:xfrm>
+              <a:off x="3454405" y="893277"/>
+              <a:ext cx="441146" cy="276999"/>
+            </a:xfrm>
+            <a:prstGeom prst="rect">
+              <a:avLst/>
+            </a:prstGeom>
+            <a:noFill/>
+          </p:spPr>
+          <p:txBody>
+            <a:bodyPr wrap="none" rtlCol="0">
+              <a:spAutoFit/>
+            </a:bodyPr>
+            <a:lstStyle/>
+            <a:p>
+              <a:r>
+                <a:rPr lang="en-US" sz="1200" b="1" dirty="0" smtClean="0"/>
+                <a:t>N=4</a:t>
+              </a:r>
+              <a:endParaRPr lang="en-US" sz="1200" b="1" dirty="0"/>
+            </a:p>
+          </p:txBody>
+        </p:sp>
+      </p:grpSp>
+      <p:grpSp>
+        <p:nvGrpSpPr>
+          <p:cNvPr id="76" name="Group 75"/>
+          <p:cNvGrpSpPr/>
+          <p:nvPr/>
+        </p:nvGrpSpPr>
+        <p:grpSpPr>
+          <a:xfrm>
+            <a:off x="637964" y="2454346"/>
+            <a:ext cx="4829797" cy="1828857"/>
+            <a:chOff x="593732" y="2302599"/>
+            <a:chExt cx="4829797" cy="1828857"/>
+          </a:xfrm>
+        </p:grpSpPr>
+        <p:sp>
+          <p:nvSpPr>
+            <p:cNvPr id="3" name="Oval 2">
+              <a:extLst>
+                <a:ext uri="{FF2B5EF4-FFF2-40B4-BE49-F238E27FC236}">
+                  <a16:creationId xmlns:a16="http://schemas.microsoft.com/office/drawing/2014/main" id="{C7CA7E8B-A0EF-424D-977E-A06A75DE837D}"/>
+                </a:ext>
+              </a:extLst>
+            </p:cNvPr>
+            <p:cNvSpPr/>
+            <p:nvPr/>
+          </p:nvSpPr>
+          <p:spPr>
+            <a:xfrm>
+              <a:off x="1071663" y="3055568"/>
+              <a:ext cx="406400" cy="406400"/>
+            </a:xfrm>
+            <a:prstGeom prst="ellipse">
+              <a:avLst/>
+            </a:prstGeom>
+            <a:solidFill>
+              <a:schemeClr val="bg1">
+                <a:lumMod val="65000"/>
+              </a:schemeClr>
+            </a:solidFill>
+            <a:ln>
+              <a:noFill/>
+            </a:ln>
+          </p:spPr>
+          <p:style>
+            <a:lnRef idx="2">
+              <a:schemeClr val="accent1">
+                <a:shade val="50000"/>
+              </a:schemeClr>
+            </a:lnRef>
+            <a:fillRef idx="1">
+              <a:schemeClr val="accent1"/>
+            </a:fillRef>
+            <a:effectRef idx="0">
+              <a:schemeClr val="accent1"/>
+            </a:effectRef>
+            <a:fontRef idx="minor">
+              <a:schemeClr val="lt1"/>
+            </a:fontRef>
+          </p:style>
+          <p:txBody>
+            <a:bodyPr rtlCol="0" anchor="ctr"/>
+            <a:lstStyle/>
+            <a:p>
+              <a:pPr algn="ctr"/>
+              <a:endParaRPr lang="en-DE"/>
+            </a:p>
+          </p:txBody>
+        </p:sp>
+        <p:sp>
+          <p:nvSpPr>
+            <p:cNvPr id="4" name="Oval 3">
+              <a:extLst>
+                <a:ext uri="{FF2B5EF4-FFF2-40B4-BE49-F238E27FC236}">
+                  <a16:creationId xmlns:a16="http://schemas.microsoft.com/office/drawing/2014/main" id="{D42037DF-EE40-A748-B850-E38A24E22E82}"/>
+                </a:ext>
+              </a:extLst>
+            </p:cNvPr>
+            <p:cNvSpPr/>
+            <p:nvPr/>
+          </p:nvSpPr>
+          <p:spPr>
+            <a:xfrm>
+              <a:off x="1856241" y="3055568"/>
+              <a:ext cx="406400" cy="406400"/>
+            </a:xfrm>
+            <a:prstGeom prst="ellipse">
+              <a:avLst/>
+            </a:prstGeom>
+            <a:solidFill>
+              <a:schemeClr val="bg1">
+                <a:lumMod val="65000"/>
+              </a:schemeClr>
+            </a:solidFill>
+            <a:ln>
+              <a:noFill/>
+            </a:ln>
+          </p:spPr>
+          <p:style>
+            <a:lnRef idx="2">
+              <a:schemeClr val="accent1">
+                <a:shade val="50000"/>
+              </a:schemeClr>
+            </a:lnRef>
+            <a:fillRef idx="1">
+              <a:schemeClr val="accent1"/>
+            </a:fillRef>
+            <a:effectRef idx="0">
+              <a:schemeClr val="accent1"/>
+            </a:effectRef>
+            <a:fontRef idx="minor">
+              <a:schemeClr val="lt1"/>
+            </a:fontRef>
+          </p:style>
+          <p:txBody>
+            <a:bodyPr rtlCol="0" anchor="ctr"/>
+            <a:lstStyle/>
+            <a:p>
+              <a:pPr algn="ctr"/>
+              <a:endParaRPr lang="en-DE"/>
+            </a:p>
+          </p:txBody>
+        </p:sp>
+        <p:sp>
+          <p:nvSpPr>
+            <p:cNvPr id="5" name="Oval 4">
+              <a:extLst>
+                <a:ext uri="{FF2B5EF4-FFF2-40B4-BE49-F238E27FC236}">
+                  <a16:creationId xmlns:a16="http://schemas.microsoft.com/office/drawing/2014/main" id="{6BFA0615-4A31-F049-87FF-2B9688FC0CEC}"/>
+                </a:ext>
+              </a:extLst>
+            </p:cNvPr>
+            <p:cNvSpPr/>
+            <p:nvPr/>
+          </p:nvSpPr>
+          <p:spPr>
+            <a:xfrm>
+              <a:off x="2646463" y="3055568"/>
+              <a:ext cx="406400" cy="406400"/>
+            </a:xfrm>
+            <a:prstGeom prst="ellipse">
+              <a:avLst/>
+            </a:prstGeom>
+            <a:solidFill>
+              <a:schemeClr val="bg1">
+                <a:lumMod val="65000"/>
+              </a:schemeClr>
+            </a:solidFill>
+            <a:ln>
+              <a:noFill/>
+            </a:ln>
+          </p:spPr>
+          <p:style>
+            <a:lnRef idx="2">
+              <a:schemeClr val="accent1">
+                <a:shade val="50000"/>
+              </a:schemeClr>
+            </a:lnRef>
+            <a:fillRef idx="1">
+              <a:schemeClr val="accent1"/>
+            </a:fillRef>
+            <a:effectRef idx="0">
+              <a:schemeClr val="accent1"/>
+            </a:effectRef>
+            <a:fontRef idx="minor">
+              <a:schemeClr val="lt1"/>
+            </a:fontRef>
+          </p:style>
+          <p:txBody>
+            <a:bodyPr rtlCol="0" anchor="ctr"/>
+            <a:lstStyle/>
+            <a:p>
+              <a:pPr algn="ctr"/>
+              <a:endParaRPr lang="en-DE"/>
+            </a:p>
+          </p:txBody>
+        </p:sp>
+        <p:sp>
+          <p:nvSpPr>
+            <p:cNvPr id="6" name="Oval 5">
+              <a:extLst>
+                <a:ext uri="{FF2B5EF4-FFF2-40B4-BE49-F238E27FC236}">
+                  <a16:creationId xmlns:a16="http://schemas.microsoft.com/office/drawing/2014/main" id="{19CB9FEA-CECC-4141-AD42-68740712D151}"/>
+                </a:ext>
+              </a:extLst>
+            </p:cNvPr>
+            <p:cNvSpPr/>
+            <p:nvPr/>
+          </p:nvSpPr>
+          <p:spPr>
+            <a:xfrm>
+              <a:off x="3436685" y="3055568"/>
+              <a:ext cx="406400" cy="406400"/>
+            </a:xfrm>
+            <a:prstGeom prst="ellipse">
+              <a:avLst/>
+            </a:prstGeom>
+            <a:solidFill>
+              <a:schemeClr val="bg1">
+                <a:lumMod val="65000"/>
+              </a:schemeClr>
+            </a:solidFill>
+            <a:ln>
+              <a:noFill/>
+            </a:ln>
+          </p:spPr>
+          <p:style>
+            <a:lnRef idx="2">
+              <a:schemeClr val="accent1">
+                <a:shade val="50000"/>
+              </a:schemeClr>
+            </a:lnRef>
+            <a:fillRef idx="1">
+              <a:schemeClr val="accent1"/>
+            </a:fillRef>
+            <a:effectRef idx="0">
+              <a:schemeClr val="accent1"/>
+            </a:effectRef>
+            <a:fontRef idx="minor">
+              <a:schemeClr val="lt1"/>
+            </a:fontRef>
+          </p:style>
+          <p:txBody>
+            <a:bodyPr rtlCol="0" anchor="ctr"/>
+            <a:lstStyle/>
+            <a:p>
+              <a:pPr algn="ctr"/>
+              <a:endParaRPr lang="en-DE"/>
+            </a:p>
+          </p:txBody>
+        </p:sp>
+        <p:sp>
+          <p:nvSpPr>
+            <p:cNvPr id="7" name="Oval 6">
+              <a:extLst>
+                <a:ext uri="{FF2B5EF4-FFF2-40B4-BE49-F238E27FC236}">
+                  <a16:creationId xmlns:a16="http://schemas.microsoft.com/office/drawing/2014/main" id="{6BFA0615-4A31-F049-87FF-2B9688FC0CEC}"/>
+                </a:ext>
+              </a:extLst>
+            </p:cNvPr>
+            <p:cNvSpPr/>
+            <p:nvPr/>
+          </p:nvSpPr>
+          <p:spPr>
+            <a:xfrm>
+              <a:off x="4226907" y="3066602"/>
+              <a:ext cx="406400" cy="406400"/>
+            </a:xfrm>
+            <a:prstGeom prst="ellipse">
+              <a:avLst/>
+            </a:prstGeom>
+            <a:solidFill>
+              <a:schemeClr val="bg1">
+                <a:lumMod val="65000"/>
+              </a:schemeClr>
+            </a:solidFill>
+            <a:ln>
+              <a:noFill/>
+            </a:ln>
+          </p:spPr>
+          <p:style>
+            <a:lnRef idx="2">
+              <a:schemeClr val="accent1">
+                <a:shade val="50000"/>
+              </a:schemeClr>
+            </a:lnRef>
+            <a:fillRef idx="1">
+              <a:schemeClr val="accent1"/>
+            </a:fillRef>
+            <a:effectRef idx="0">
+              <a:schemeClr val="accent1"/>
+            </a:effectRef>
+            <a:fontRef idx="minor">
+              <a:schemeClr val="lt1"/>
+            </a:fontRef>
+          </p:style>
+          <p:txBody>
+            <a:bodyPr rtlCol="0" anchor="ctr"/>
+            <a:lstStyle/>
+            <a:p>
+              <a:pPr algn="ctr"/>
+              <a:endParaRPr lang="en-DE"/>
+            </a:p>
+          </p:txBody>
+        </p:sp>
+        <p:sp>
+          <p:nvSpPr>
+            <p:cNvPr id="8" name="Oval 7">
+              <a:extLst>
+                <a:ext uri="{FF2B5EF4-FFF2-40B4-BE49-F238E27FC236}">
+                  <a16:creationId xmlns:a16="http://schemas.microsoft.com/office/drawing/2014/main" id="{19CB9FEA-CECC-4141-AD42-68740712D151}"/>
+                </a:ext>
+              </a:extLst>
+            </p:cNvPr>
+            <p:cNvSpPr/>
+            <p:nvPr/>
+          </p:nvSpPr>
+          <p:spPr>
+            <a:xfrm>
+              <a:off x="5017129" y="3066602"/>
+              <a:ext cx="406400" cy="406400"/>
+            </a:xfrm>
+            <a:prstGeom prst="ellipse">
+              <a:avLst/>
+            </a:prstGeom>
+            <a:solidFill>
+              <a:schemeClr val="bg1">
+                <a:lumMod val="65000"/>
+              </a:schemeClr>
+            </a:solidFill>
+            <a:ln>
+              <a:noFill/>
+            </a:ln>
+          </p:spPr>
+          <p:style>
+            <a:lnRef idx="2">
+              <a:schemeClr val="accent1">
+                <a:shade val="50000"/>
+              </a:schemeClr>
+            </a:lnRef>
+            <a:fillRef idx="1">
+              <a:schemeClr val="accent1"/>
+            </a:fillRef>
+            <a:effectRef idx="0">
+              <a:schemeClr val="accent1"/>
+            </a:effectRef>
+            <a:fontRef idx="minor">
+              <a:schemeClr val="lt1"/>
+            </a:fontRef>
+          </p:style>
+          <p:txBody>
+            <a:bodyPr rtlCol="0" anchor="ctr"/>
+            <a:lstStyle/>
+            <a:p>
+              <a:pPr algn="ctr"/>
+              <a:endParaRPr lang="en-DE"/>
+            </a:p>
+          </p:txBody>
+        </p:sp>
+        <p:sp>
+          <p:nvSpPr>
+            <p:cNvPr id="9" name="TextBox 8"/>
+            <p:cNvSpPr txBox="1"/>
+            <p:nvPr/>
+          </p:nvSpPr>
+          <p:spPr>
+            <a:xfrm>
+              <a:off x="1124020" y="3085136"/>
+              <a:ext cx="301686" cy="369332"/>
+            </a:xfrm>
+            <a:prstGeom prst="rect">
+              <a:avLst/>
+            </a:prstGeom>
+            <a:noFill/>
+          </p:spPr>
+          <p:txBody>
+            <a:bodyPr wrap="none" rtlCol="0">
+              <a:spAutoFit/>
+            </a:bodyPr>
+            <a:lstStyle/>
+            <a:p>
+              <a:r>
+                <a:rPr lang="en-US" dirty="0" smtClean="0"/>
+                <a:t>0</a:t>
+              </a:r>
+              <a:endParaRPr lang="en-US" dirty="0"/>
+            </a:p>
+          </p:txBody>
+        </p:sp>
+        <p:sp>
+          <p:nvSpPr>
+            <p:cNvPr id="10" name="TextBox 9"/>
+            <p:cNvSpPr txBox="1"/>
+            <p:nvPr/>
+          </p:nvSpPr>
+          <p:spPr>
+            <a:xfrm>
+              <a:off x="1908598" y="3074102"/>
+              <a:ext cx="301686" cy="369332"/>
+            </a:xfrm>
+            <a:prstGeom prst="rect">
+              <a:avLst/>
+            </a:prstGeom>
+            <a:noFill/>
+          </p:spPr>
+          <p:txBody>
+            <a:bodyPr wrap="none" rtlCol="0">
+              <a:spAutoFit/>
+            </a:bodyPr>
+            <a:lstStyle/>
+            <a:p>
+              <a:r>
+                <a:rPr lang="en-US" dirty="0" smtClean="0"/>
+                <a:t>1</a:t>
+              </a:r>
+              <a:endParaRPr lang="en-US" dirty="0"/>
+            </a:p>
+          </p:txBody>
+        </p:sp>
+        <p:sp>
+          <p:nvSpPr>
+            <p:cNvPr id="11" name="TextBox 10"/>
+            <p:cNvSpPr txBox="1"/>
+            <p:nvPr/>
+          </p:nvSpPr>
+          <p:spPr>
+            <a:xfrm>
+              <a:off x="2702216" y="3066602"/>
+              <a:ext cx="301686" cy="369332"/>
+            </a:xfrm>
+            <a:prstGeom prst="rect">
+              <a:avLst/>
+            </a:prstGeom>
+            <a:noFill/>
+          </p:spPr>
+          <p:txBody>
+            <a:bodyPr wrap="none" rtlCol="0">
+              <a:spAutoFit/>
+            </a:bodyPr>
+            <a:lstStyle/>
+            <a:p>
+              <a:r>
+                <a:rPr lang="en-US" dirty="0" smtClean="0"/>
+                <a:t>2</a:t>
+              </a:r>
+              <a:endParaRPr lang="en-US" dirty="0"/>
+            </a:p>
+          </p:txBody>
+        </p:sp>
+        <p:sp>
+          <p:nvSpPr>
+            <p:cNvPr id="12" name="TextBox 11"/>
+            <p:cNvSpPr txBox="1"/>
+            <p:nvPr/>
+          </p:nvSpPr>
+          <p:spPr>
+            <a:xfrm>
+              <a:off x="3489042" y="3066602"/>
+              <a:ext cx="301686" cy="369332"/>
+            </a:xfrm>
+            <a:prstGeom prst="rect">
+              <a:avLst/>
+            </a:prstGeom>
+            <a:noFill/>
+          </p:spPr>
+          <p:txBody>
+            <a:bodyPr wrap="none" rtlCol="0">
+              <a:spAutoFit/>
+            </a:bodyPr>
+            <a:lstStyle/>
+            <a:p>
+              <a:r>
+                <a:rPr lang="en-US" dirty="0" smtClean="0"/>
+                <a:t>3</a:t>
+              </a:r>
+              <a:endParaRPr lang="en-US" dirty="0"/>
+            </a:p>
+          </p:txBody>
+        </p:sp>
+        <p:sp>
+          <p:nvSpPr>
+            <p:cNvPr id="13" name="TextBox 12"/>
+            <p:cNvSpPr txBox="1"/>
+            <p:nvPr/>
+          </p:nvSpPr>
+          <p:spPr>
+            <a:xfrm>
+              <a:off x="4273986" y="3085136"/>
+              <a:ext cx="301686" cy="369332"/>
+            </a:xfrm>
+            <a:prstGeom prst="rect">
+              <a:avLst/>
+            </a:prstGeom>
+            <a:noFill/>
+          </p:spPr>
+          <p:txBody>
+            <a:bodyPr wrap="none" rtlCol="0">
+              <a:spAutoFit/>
+            </a:bodyPr>
+            <a:lstStyle/>
+            <a:p>
+              <a:r>
+                <a:rPr lang="en-US" dirty="0" smtClean="0"/>
+                <a:t>4</a:t>
+              </a:r>
+              <a:endParaRPr lang="en-US" dirty="0"/>
+            </a:p>
+          </p:txBody>
+        </p:sp>
+        <p:sp>
+          <p:nvSpPr>
+            <p:cNvPr id="14" name="TextBox 13"/>
+            <p:cNvSpPr txBox="1"/>
+            <p:nvPr/>
+          </p:nvSpPr>
+          <p:spPr>
+            <a:xfrm>
+              <a:off x="5069486" y="3074102"/>
+              <a:ext cx="301686" cy="369332"/>
+            </a:xfrm>
+            <a:prstGeom prst="rect">
+              <a:avLst/>
+            </a:prstGeom>
+            <a:noFill/>
+          </p:spPr>
+          <p:txBody>
+            <a:bodyPr wrap="none" rtlCol="0">
+              <a:spAutoFit/>
+            </a:bodyPr>
+            <a:lstStyle/>
+            <a:p>
+              <a:r>
+                <a:rPr lang="en-US" dirty="0" smtClean="0"/>
+                <a:t>5</a:t>
+              </a:r>
+              <a:endParaRPr lang="en-US" dirty="0"/>
+            </a:p>
+          </p:txBody>
+        </p:sp>
+        <p:sp>
+          <p:nvSpPr>
+            <p:cNvPr id="15" name="Right Brace 14"/>
+            <p:cNvSpPr/>
+            <p:nvPr/>
+          </p:nvSpPr>
+          <p:spPr>
+            <a:xfrm rot="5400000">
+              <a:off x="3144715" y="3314769"/>
+              <a:ext cx="194390" cy="825390"/>
+            </a:xfrm>
+            <a:prstGeom prst="rightBrace">
+              <a:avLst>
+                <a:gd name="adj1" fmla="val 36253"/>
+                <a:gd name="adj2" fmla="val 50000"/>
+              </a:avLst>
+            </a:prstGeom>
+          </p:spPr>
+          <p:style>
+            <a:lnRef idx="1">
+              <a:schemeClr val="accent1"/>
+            </a:lnRef>
+            <a:fillRef idx="0">
+              <a:schemeClr val="accent1"/>
+            </a:fillRef>
+            <a:effectRef idx="0">
+              <a:schemeClr val="accent1"/>
+            </a:effectRef>
+            <a:fontRef idx="minor">
+              <a:schemeClr val="tx1"/>
+            </a:fontRef>
+          </p:style>
+          <p:txBody>
+            <a:bodyPr rtlCol="0" anchor="ctr"/>
+            <a:lstStyle/>
+            <a:p>
+              <a:pPr algn="ctr"/>
+              <a:endParaRPr lang="en-US"/>
+            </a:p>
+          </p:txBody>
+        </p:sp>
+        <p:sp>
+          <p:nvSpPr>
+            <p:cNvPr id="16" name="TextBox 15"/>
+            <p:cNvSpPr txBox="1"/>
+            <p:nvPr/>
+          </p:nvSpPr>
+          <p:spPr>
+            <a:xfrm>
+              <a:off x="2829216" y="3854457"/>
+              <a:ext cx="926857" cy="276999"/>
+            </a:xfrm>
+            <a:prstGeom prst="rect">
+              <a:avLst/>
+            </a:prstGeom>
+            <a:noFill/>
+          </p:spPr>
+          <p:txBody>
+            <a:bodyPr wrap="none" rtlCol="0">
+              <a:spAutoFit/>
+            </a:bodyPr>
+            <a:lstStyle/>
+            <a:p>
+              <a:r>
+                <a:rPr lang="en-US" sz="1200" b="1" dirty="0" smtClean="0"/>
+                <a:t>Middle pair</a:t>
+              </a:r>
+              <a:endParaRPr lang="en-US" sz="1200" b="1" dirty="0"/>
+            </a:p>
+          </p:txBody>
+        </p:sp>
+        <p:sp>
+          <p:nvSpPr>
+            <p:cNvPr id="17" name="Right Brace 16"/>
+            <p:cNvSpPr/>
+            <p:nvPr/>
+          </p:nvSpPr>
+          <p:spPr>
+            <a:xfrm rot="16200000">
+              <a:off x="3046171" y="1587682"/>
+              <a:ext cx="350392" cy="2373906"/>
+            </a:xfrm>
+            <a:prstGeom prst="rightBrace">
+              <a:avLst/>
+            </a:prstGeom>
+          </p:spPr>
+          <p:style>
+            <a:lnRef idx="1">
+              <a:schemeClr val="accent1"/>
+            </a:lnRef>
+            <a:fillRef idx="0">
+              <a:schemeClr val="accent1"/>
+            </a:fillRef>
+            <a:effectRef idx="0">
+              <a:schemeClr val="accent1"/>
+            </a:effectRef>
+            <a:fontRef idx="minor">
+              <a:schemeClr val="tx1"/>
+            </a:fontRef>
+          </p:style>
+          <p:txBody>
+            <a:bodyPr rtlCol="0" anchor="ctr"/>
+            <a:lstStyle/>
+            <a:p>
+              <a:pPr algn="ctr"/>
+              <a:endParaRPr lang="en-US"/>
+            </a:p>
+          </p:txBody>
+        </p:sp>
+        <p:sp>
+          <p:nvSpPr>
+            <p:cNvPr id="18" name="TextBox 17"/>
+            <p:cNvSpPr txBox="1"/>
+            <p:nvPr/>
+          </p:nvSpPr>
+          <p:spPr>
+            <a:xfrm>
+              <a:off x="2687169" y="2302599"/>
+              <a:ext cx="1128579" cy="276999"/>
+            </a:xfrm>
+            <a:prstGeom prst="rect">
+              <a:avLst/>
+            </a:prstGeom>
+            <a:noFill/>
+          </p:spPr>
+          <p:txBody>
+            <a:bodyPr wrap="none" rtlCol="0">
+              <a:spAutoFit/>
+            </a:bodyPr>
+            <a:lstStyle/>
+            <a:p>
+              <a:r>
+                <a:rPr lang="en-US" sz="1200" b="1" dirty="0" smtClean="0"/>
+                <a:t>Projection pair</a:t>
+              </a:r>
+              <a:endParaRPr lang="en-US" sz="1200" b="1" dirty="0"/>
+            </a:p>
+          </p:txBody>
+        </p:sp>
+        <p:sp>
+          <p:nvSpPr>
+            <p:cNvPr id="72" name="TextBox 71"/>
+            <p:cNvSpPr txBox="1"/>
+            <p:nvPr/>
+          </p:nvSpPr>
+          <p:spPr>
+            <a:xfrm>
+              <a:off x="593732" y="3120268"/>
+              <a:ext cx="441146" cy="276999"/>
+            </a:xfrm>
+            <a:prstGeom prst="rect">
+              <a:avLst/>
+            </a:prstGeom>
+            <a:noFill/>
+          </p:spPr>
+          <p:txBody>
+            <a:bodyPr wrap="none" rtlCol="0">
+              <a:spAutoFit/>
+            </a:bodyPr>
+            <a:lstStyle/>
+            <a:p>
+              <a:r>
+                <a:rPr lang="en-US" sz="1200" b="1" dirty="0" smtClean="0"/>
+                <a:t>N=6</a:t>
+              </a:r>
+              <a:endParaRPr lang="en-US" sz="1200" b="1" dirty="0"/>
+            </a:p>
+          </p:txBody>
+        </p:sp>
+      </p:grpSp>
+      <p:grpSp>
+        <p:nvGrpSpPr>
+          <p:cNvPr id="77" name="Group 76"/>
+          <p:cNvGrpSpPr/>
+          <p:nvPr/>
+        </p:nvGrpSpPr>
+        <p:grpSpPr>
+          <a:xfrm>
+            <a:off x="6494524" y="2421318"/>
+            <a:ext cx="4793012" cy="1861885"/>
+            <a:chOff x="6450292" y="2269571"/>
+            <a:chExt cx="4793012" cy="1861885"/>
+          </a:xfrm>
+        </p:grpSpPr>
+        <p:sp>
+          <p:nvSpPr>
+            <p:cNvPr id="19" name="Oval 18">
+              <a:extLst>
+                <a:ext uri="{FF2B5EF4-FFF2-40B4-BE49-F238E27FC236}">
+                  <a16:creationId xmlns:a16="http://schemas.microsoft.com/office/drawing/2014/main" id="{C7CA7E8B-A0EF-424D-977E-A06A75DE837D}"/>
+                </a:ext>
+              </a:extLst>
+            </p:cNvPr>
+            <p:cNvSpPr/>
+            <p:nvPr/>
+          </p:nvSpPr>
+          <p:spPr>
+            <a:xfrm>
+              <a:off x="6891438" y="3055568"/>
+              <a:ext cx="406400" cy="406400"/>
+            </a:xfrm>
+            <a:prstGeom prst="ellipse">
+              <a:avLst/>
+            </a:prstGeom>
+            <a:solidFill>
+              <a:schemeClr val="bg1">
+                <a:lumMod val="65000"/>
+              </a:schemeClr>
+            </a:solidFill>
+            <a:ln>
+              <a:noFill/>
+            </a:ln>
+          </p:spPr>
+          <p:style>
+            <a:lnRef idx="2">
+              <a:schemeClr val="accent1">
+                <a:shade val="50000"/>
+              </a:schemeClr>
+            </a:lnRef>
+            <a:fillRef idx="1">
+              <a:schemeClr val="accent1"/>
+            </a:fillRef>
+            <a:effectRef idx="0">
+              <a:schemeClr val="accent1"/>
+            </a:effectRef>
+            <a:fontRef idx="minor">
+              <a:schemeClr val="lt1"/>
+            </a:fontRef>
+          </p:style>
+          <p:txBody>
+            <a:bodyPr rtlCol="0" anchor="ctr"/>
+            <a:lstStyle/>
+            <a:p>
+              <a:pPr algn="ctr"/>
+              <a:endParaRPr lang="en-DE"/>
+            </a:p>
+          </p:txBody>
+        </p:sp>
+        <p:sp>
+          <p:nvSpPr>
+            <p:cNvPr id="20" name="Oval 19">
+              <a:extLst>
+                <a:ext uri="{FF2B5EF4-FFF2-40B4-BE49-F238E27FC236}">
+                  <a16:creationId xmlns:a16="http://schemas.microsoft.com/office/drawing/2014/main" id="{D42037DF-EE40-A748-B850-E38A24E22E82}"/>
+                </a:ext>
+              </a:extLst>
+            </p:cNvPr>
+            <p:cNvSpPr/>
+            <p:nvPr/>
+          </p:nvSpPr>
+          <p:spPr>
+            <a:xfrm>
+              <a:off x="7676016" y="3055568"/>
+              <a:ext cx="406400" cy="406400"/>
+            </a:xfrm>
+            <a:prstGeom prst="ellipse">
+              <a:avLst/>
+            </a:prstGeom>
+            <a:solidFill>
+              <a:schemeClr val="bg1">
+                <a:lumMod val="65000"/>
+              </a:schemeClr>
+            </a:solidFill>
+            <a:ln>
+              <a:noFill/>
+            </a:ln>
+          </p:spPr>
+          <p:style>
+            <a:lnRef idx="2">
+              <a:schemeClr val="accent1">
+                <a:shade val="50000"/>
+              </a:schemeClr>
+            </a:lnRef>
+            <a:fillRef idx="1">
+              <a:schemeClr val="accent1"/>
+            </a:fillRef>
+            <a:effectRef idx="0">
+              <a:schemeClr val="accent1"/>
+            </a:effectRef>
+            <a:fontRef idx="minor">
+              <a:schemeClr val="lt1"/>
+            </a:fontRef>
+          </p:style>
+          <p:txBody>
+            <a:bodyPr rtlCol="0" anchor="ctr"/>
+            <a:lstStyle/>
+            <a:p>
+              <a:pPr algn="ctr"/>
+              <a:endParaRPr lang="en-DE"/>
+            </a:p>
+          </p:txBody>
+        </p:sp>
+        <p:sp>
+          <p:nvSpPr>
+            <p:cNvPr id="21" name="Oval 20">
+              <a:extLst>
+                <a:ext uri="{FF2B5EF4-FFF2-40B4-BE49-F238E27FC236}">
+                  <a16:creationId xmlns:a16="http://schemas.microsoft.com/office/drawing/2014/main" id="{6BFA0615-4A31-F049-87FF-2B9688FC0CEC}"/>
+                </a:ext>
+              </a:extLst>
+            </p:cNvPr>
+            <p:cNvSpPr/>
+            <p:nvPr/>
+          </p:nvSpPr>
+          <p:spPr>
+            <a:xfrm>
+              <a:off x="8466238" y="3055568"/>
+              <a:ext cx="406400" cy="406400"/>
+            </a:xfrm>
+            <a:prstGeom prst="ellipse">
+              <a:avLst/>
+            </a:prstGeom>
+            <a:solidFill>
+              <a:schemeClr val="bg1">
+                <a:lumMod val="65000"/>
+              </a:schemeClr>
+            </a:solidFill>
+            <a:ln>
+              <a:noFill/>
+            </a:ln>
+          </p:spPr>
+          <p:style>
+            <a:lnRef idx="2">
+              <a:schemeClr val="accent1">
+                <a:shade val="50000"/>
+              </a:schemeClr>
+            </a:lnRef>
+            <a:fillRef idx="1">
+              <a:schemeClr val="accent1"/>
+            </a:fillRef>
+            <a:effectRef idx="0">
+              <a:schemeClr val="accent1"/>
+            </a:effectRef>
+            <a:fontRef idx="minor">
+              <a:schemeClr val="lt1"/>
+            </a:fontRef>
+          </p:style>
+          <p:txBody>
+            <a:bodyPr rtlCol="0" anchor="ctr"/>
+            <a:lstStyle/>
+            <a:p>
+              <a:pPr algn="ctr"/>
+              <a:endParaRPr lang="en-DE"/>
+            </a:p>
+          </p:txBody>
+        </p:sp>
+        <p:sp>
+          <p:nvSpPr>
+            <p:cNvPr id="22" name="Oval 21">
+              <a:extLst>
+                <a:ext uri="{FF2B5EF4-FFF2-40B4-BE49-F238E27FC236}">
+                  <a16:creationId xmlns:a16="http://schemas.microsoft.com/office/drawing/2014/main" id="{19CB9FEA-CECC-4141-AD42-68740712D151}"/>
+                </a:ext>
+              </a:extLst>
+            </p:cNvPr>
+            <p:cNvSpPr/>
+            <p:nvPr/>
+          </p:nvSpPr>
+          <p:spPr>
+            <a:xfrm>
+              <a:off x="9256460" y="3055568"/>
+              <a:ext cx="406400" cy="406400"/>
+            </a:xfrm>
+            <a:prstGeom prst="ellipse">
+              <a:avLst/>
+            </a:prstGeom>
+            <a:solidFill>
+              <a:schemeClr val="bg1">
+                <a:lumMod val="65000"/>
+              </a:schemeClr>
+            </a:solidFill>
+            <a:ln>
+              <a:noFill/>
+            </a:ln>
+          </p:spPr>
+          <p:style>
+            <a:lnRef idx="2">
+              <a:schemeClr val="accent1">
+                <a:shade val="50000"/>
+              </a:schemeClr>
+            </a:lnRef>
+            <a:fillRef idx="1">
+              <a:schemeClr val="accent1"/>
+            </a:fillRef>
+            <a:effectRef idx="0">
+              <a:schemeClr val="accent1"/>
+            </a:effectRef>
+            <a:fontRef idx="minor">
+              <a:schemeClr val="lt1"/>
+            </a:fontRef>
+          </p:style>
+          <p:txBody>
+            <a:bodyPr rtlCol="0" anchor="ctr"/>
+            <a:lstStyle/>
+            <a:p>
+              <a:pPr algn="ctr"/>
+              <a:endParaRPr lang="en-DE"/>
+            </a:p>
+          </p:txBody>
+        </p:sp>
+        <p:sp>
+          <p:nvSpPr>
+            <p:cNvPr id="23" name="Oval 22">
+              <a:extLst>
+                <a:ext uri="{FF2B5EF4-FFF2-40B4-BE49-F238E27FC236}">
+                  <a16:creationId xmlns:a16="http://schemas.microsoft.com/office/drawing/2014/main" id="{6BFA0615-4A31-F049-87FF-2B9688FC0CEC}"/>
+                </a:ext>
+              </a:extLst>
+            </p:cNvPr>
+            <p:cNvSpPr/>
+            <p:nvPr/>
+          </p:nvSpPr>
+          <p:spPr>
+            <a:xfrm>
+              <a:off x="10046682" y="3066602"/>
+              <a:ext cx="406400" cy="406400"/>
+            </a:xfrm>
+            <a:prstGeom prst="ellipse">
+              <a:avLst/>
+            </a:prstGeom>
+            <a:solidFill>
+              <a:schemeClr val="bg1">
+                <a:lumMod val="65000"/>
+              </a:schemeClr>
+            </a:solidFill>
+            <a:ln>
+              <a:noFill/>
+            </a:ln>
+          </p:spPr>
+          <p:style>
+            <a:lnRef idx="2">
+              <a:schemeClr val="accent1">
+                <a:shade val="50000"/>
+              </a:schemeClr>
+            </a:lnRef>
+            <a:fillRef idx="1">
+              <a:schemeClr val="accent1"/>
+            </a:fillRef>
+            <a:effectRef idx="0">
+              <a:schemeClr val="accent1"/>
+            </a:effectRef>
+            <a:fontRef idx="minor">
+              <a:schemeClr val="lt1"/>
+            </a:fontRef>
+          </p:style>
+          <p:txBody>
+            <a:bodyPr rtlCol="0" anchor="ctr"/>
+            <a:lstStyle/>
+            <a:p>
+              <a:pPr algn="ctr"/>
+              <a:endParaRPr lang="en-DE"/>
+            </a:p>
+          </p:txBody>
+        </p:sp>
+        <p:sp>
+          <p:nvSpPr>
+            <p:cNvPr id="24" name="Oval 23">
+              <a:extLst>
+                <a:ext uri="{FF2B5EF4-FFF2-40B4-BE49-F238E27FC236}">
+                  <a16:creationId xmlns:a16="http://schemas.microsoft.com/office/drawing/2014/main" id="{19CB9FEA-CECC-4141-AD42-68740712D151}"/>
+                </a:ext>
+              </a:extLst>
+            </p:cNvPr>
+            <p:cNvSpPr/>
+            <p:nvPr/>
+          </p:nvSpPr>
+          <p:spPr>
+            <a:xfrm>
+              <a:off x="10836904" y="3066602"/>
+              <a:ext cx="406400" cy="406400"/>
+            </a:xfrm>
+            <a:prstGeom prst="ellipse">
+              <a:avLst/>
+            </a:prstGeom>
+            <a:solidFill>
+              <a:schemeClr val="bg1">
+                <a:lumMod val="65000"/>
+              </a:schemeClr>
+            </a:solidFill>
+            <a:ln>
+              <a:noFill/>
+            </a:ln>
+          </p:spPr>
+          <p:style>
+            <a:lnRef idx="2">
+              <a:schemeClr val="accent1">
+                <a:shade val="50000"/>
+              </a:schemeClr>
+            </a:lnRef>
+            <a:fillRef idx="1">
+              <a:schemeClr val="accent1"/>
+            </a:fillRef>
+            <a:effectRef idx="0">
+              <a:schemeClr val="accent1"/>
+            </a:effectRef>
+            <a:fontRef idx="minor">
+              <a:schemeClr val="lt1"/>
+            </a:fontRef>
+          </p:style>
+          <p:txBody>
+            <a:bodyPr rtlCol="0" anchor="ctr"/>
+            <a:lstStyle/>
+            <a:p>
+              <a:pPr algn="ctr"/>
+              <a:endParaRPr lang="en-DE"/>
+            </a:p>
+          </p:txBody>
+        </p:sp>
+        <p:sp>
+          <p:nvSpPr>
+            <p:cNvPr id="25" name="TextBox 24"/>
+            <p:cNvSpPr txBox="1"/>
+            <p:nvPr/>
+          </p:nvSpPr>
+          <p:spPr>
+            <a:xfrm>
+              <a:off x="6943795" y="3085136"/>
+              <a:ext cx="301686" cy="369332"/>
+            </a:xfrm>
+            <a:prstGeom prst="rect">
+              <a:avLst/>
+            </a:prstGeom>
+            <a:noFill/>
+          </p:spPr>
+          <p:txBody>
+            <a:bodyPr wrap="none" rtlCol="0">
+              <a:spAutoFit/>
+            </a:bodyPr>
+            <a:lstStyle/>
+            <a:p>
+              <a:r>
+                <a:rPr lang="en-US" dirty="0" smtClean="0"/>
+                <a:t>0</a:t>
+              </a:r>
+              <a:endParaRPr lang="en-US" dirty="0"/>
+            </a:p>
+          </p:txBody>
+        </p:sp>
+        <p:sp>
+          <p:nvSpPr>
+            <p:cNvPr id="26" name="TextBox 25"/>
+            <p:cNvSpPr txBox="1"/>
+            <p:nvPr/>
+          </p:nvSpPr>
+          <p:spPr>
+            <a:xfrm>
+              <a:off x="7728373" y="3074102"/>
+              <a:ext cx="301686" cy="369332"/>
+            </a:xfrm>
+            <a:prstGeom prst="rect">
+              <a:avLst/>
+            </a:prstGeom>
+            <a:noFill/>
+          </p:spPr>
+          <p:txBody>
+            <a:bodyPr wrap="none" rtlCol="0">
+              <a:spAutoFit/>
+            </a:bodyPr>
+            <a:lstStyle/>
+            <a:p>
+              <a:r>
+                <a:rPr lang="en-US" dirty="0" smtClean="0"/>
+                <a:t>1</a:t>
+              </a:r>
+              <a:endParaRPr lang="en-US" dirty="0"/>
+            </a:p>
+          </p:txBody>
+        </p:sp>
+        <p:sp>
+          <p:nvSpPr>
+            <p:cNvPr id="27" name="TextBox 26"/>
+            <p:cNvSpPr txBox="1"/>
+            <p:nvPr/>
+          </p:nvSpPr>
+          <p:spPr>
+            <a:xfrm>
+              <a:off x="8521991" y="3066602"/>
+              <a:ext cx="301686" cy="369332"/>
+            </a:xfrm>
+            <a:prstGeom prst="rect">
+              <a:avLst/>
+            </a:prstGeom>
+            <a:noFill/>
+          </p:spPr>
+          <p:txBody>
+            <a:bodyPr wrap="none" rtlCol="0">
+              <a:spAutoFit/>
+            </a:bodyPr>
+            <a:lstStyle/>
+            <a:p>
+              <a:r>
+                <a:rPr lang="en-US" dirty="0" smtClean="0"/>
+                <a:t>2</a:t>
+              </a:r>
+              <a:endParaRPr lang="en-US" dirty="0"/>
+            </a:p>
+          </p:txBody>
+        </p:sp>
+        <p:sp>
+          <p:nvSpPr>
+            <p:cNvPr id="28" name="TextBox 27"/>
+            <p:cNvSpPr txBox="1"/>
+            <p:nvPr/>
+          </p:nvSpPr>
+          <p:spPr>
+            <a:xfrm>
+              <a:off x="9308817" y="3066602"/>
+              <a:ext cx="301686" cy="369332"/>
+            </a:xfrm>
+            <a:prstGeom prst="rect">
+              <a:avLst/>
+            </a:prstGeom>
+            <a:noFill/>
+          </p:spPr>
+          <p:txBody>
+            <a:bodyPr wrap="none" rtlCol="0">
+              <a:spAutoFit/>
+            </a:bodyPr>
+            <a:lstStyle/>
+            <a:p>
+              <a:r>
+                <a:rPr lang="en-US" dirty="0" smtClean="0"/>
+                <a:t>3</a:t>
+              </a:r>
+              <a:endParaRPr lang="en-US" dirty="0"/>
+            </a:p>
+          </p:txBody>
+        </p:sp>
+        <p:sp>
+          <p:nvSpPr>
+            <p:cNvPr id="29" name="TextBox 28"/>
+            <p:cNvSpPr txBox="1"/>
+            <p:nvPr/>
+          </p:nvSpPr>
+          <p:spPr>
+            <a:xfrm>
+              <a:off x="10093761" y="3085136"/>
+              <a:ext cx="301686" cy="369332"/>
+            </a:xfrm>
+            <a:prstGeom prst="rect">
+              <a:avLst/>
+            </a:prstGeom>
+            <a:noFill/>
+          </p:spPr>
+          <p:txBody>
+            <a:bodyPr wrap="none" rtlCol="0">
+              <a:spAutoFit/>
+            </a:bodyPr>
+            <a:lstStyle/>
+            <a:p>
+              <a:r>
+                <a:rPr lang="en-US" dirty="0" smtClean="0"/>
+                <a:t>4</a:t>
+              </a:r>
+              <a:endParaRPr lang="en-US" dirty="0"/>
+            </a:p>
+          </p:txBody>
+        </p:sp>
+        <p:sp>
+          <p:nvSpPr>
+            <p:cNvPr id="30" name="TextBox 29"/>
+            <p:cNvSpPr txBox="1"/>
+            <p:nvPr/>
+          </p:nvSpPr>
+          <p:spPr>
+            <a:xfrm>
+              <a:off x="10889261" y="3074102"/>
+              <a:ext cx="301686" cy="369332"/>
+            </a:xfrm>
+            <a:prstGeom prst="rect">
+              <a:avLst/>
+            </a:prstGeom>
+            <a:noFill/>
+          </p:spPr>
+          <p:txBody>
+            <a:bodyPr wrap="none" rtlCol="0">
+              <a:spAutoFit/>
+            </a:bodyPr>
+            <a:lstStyle/>
+            <a:p>
+              <a:r>
+                <a:rPr lang="en-US" dirty="0" smtClean="0"/>
+                <a:t>5</a:t>
+              </a:r>
+              <a:endParaRPr lang="en-US" dirty="0"/>
+            </a:p>
+          </p:txBody>
+        </p:sp>
+        <p:sp>
+          <p:nvSpPr>
+            <p:cNvPr id="31" name="Right Brace 30"/>
+            <p:cNvSpPr/>
+            <p:nvPr/>
+          </p:nvSpPr>
+          <p:spPr>
+            <a:xfrm rot="5400000">
+              <a:off x="8964490" y="3314769"/>
+              <a:ext cx="194390" cy="825390"/>
+            </a:xfrm>
+            <a:prstGeom prst="rightBrace">
+              <a:avLst>
+                <a:gd name="adj1" fmla="val 36253"/>
+                <a:gd name="adj2" fmla="val 50000"/>
+              </a:avLst>
+            </a:prstGeom>
+          </p:spPr>
+          <p:style>
+            <a:lnRef idx="1">
+              <a:schemeClr val="accent1"/>
+            </a:lnRef>
+            <a:fillRef idx="0">
+              <a:schemeClr val="accent1"/>
+            </a:fillRef>
+            <a:effectRef idx="0">
+              <a:schemeClr val="accent1"/>
+            </a:effectRef>
+            <a:fontRef idx="minor">
+              <a:schemeClr val="tx1"/>
+            </a:fontRef>
+          </p:style>
+          <p:txBody>
+            <a:bodyPr rtlCol="0" anchor="ctr"/>
+            <a:lstStyle/>
+            <a:p>
+              <a:pPr algn="ctr"/>
+              <a:endParaRPr lang="en-US"/>
+            </a:p>
+          </p:txBody>
+        </p:sp>
+        <p:sp>
+          <p:nvSpPr>
+            <p:cNvPr id="32" name="TextBox 31"/>
+            <p:cNvSpPr txBox="1"/>
+            <p:nvPr/>
+          </p:nvSpPr>
+          <p:spPr>
+            <a:xfrm>
+              <a:off x="8648991" y="3854457"/>
+              <a:ext cx="926857" cy="276999"/>
+            </a:xfrm>
+            <a:prstGeom prst="rect">
+              <a:avLst/>
+            </a:prstGeom>
+            <a:noFill/>
+          </p:spPr>
+          <p:txBody>
+            <a:bodyPr wrap="none" rtlCol="0">
+              <a:spAutoFit/>
+            </a:bodyPr>
+            <a:lstStyle/>
+            <a:p>
+              <a:r>
+                <a:rPr lang="en-US" sz="1200" b="1" dirty="0" smtClean="0"/>
+                <a:t>Middle pair</a:t>
+              </a:r>
+              <a:endParaRPr lang="en-US" sz="1200" b="1" dirty="0"/>
+            </a:p>
+          </p:txBody>
+        </p:sp>
+        <p:sp>
+          <p:nvSpPr>
+            <p:cNvPr id="33" name="Right Brace 32"/>
+            <p:cNvSpPr/>
+            <p:nvPr/>
+          </p:nvSpPr>
+          <p:spPr>
+            <a:xfrm rot="16200000">
+              <a:off x="8876562" y="798196"/>
+              <a:ext cx="350391" cy="3952877"/>
+            </a:xfrm>
+            <a:prstGeom prst="rightBrace">
+              <a:avLst/>
+            </a:prstGeom>
+          </p:spPr>
+          <p:style>
+            <a:lnRef idx="1">
+              <a:schemeClr val="accent1"/>
+            </a:lnRef>
+            <a:fillRef idx="0">
+              <a:schemeClr val="accent1"/>
+            </a:fillRef>
+            <a:effectRef idx="0">
+              <a:schemeClr val="accent1"/>
+            </a:effectRef>
+            <a:fontRef idx="minor">
+              <a:schemeClr val="tx1"/>
+            </a:fontRef>
+          </p:style>
+          <p:txBody>
+            <a:bodyPr rtlCol="0" anchor="ctr"/>
+            <a:lstStyle/>
+            <a:p>
+              <a:pPr algn="ctr"/>
+              <a:endParaRPr lang="en-US"/>
+            </a:p>
+          </p:txBody>
+        </p:sp>
+        <p:sp>
+          <p:nvSpPr>
+            <p:cNvPr id="34" name="TextBox 33"/>
+            <p:cNvSpPr txBox="1"/>
+            <p:nvPr/>
+          </p:nvSpPr>
+          <p:spPr>
+            <a:xfrm>
+              <a:off x="8497395" y="2269571"/>
+              <a:ext cx="1128579" cy="276999"/>
+            </a:xfrm>
+            <a:prstGeom prst="rect">
+              <a:avLst/>
+            </a:prstGeom>
+            <a:noFill/>
+          </p:spPr>
+          <p:txBody>
+            <a:bodyPr wrap="none" rtlCol="0">
+              <a:spAutoFit/>
+            </a:bodyPr>
+            <a:lstStyle/>
+            <a:p>
+              <a:r>
+                <a:rPr lang="en-US" sz="1200" b="1" dirty="0" smtClean="0"/>
+                <a:t>Projection pair</a:t>
+              </a:r>
+              <a:endParaRPr lang="en-US" sz="1200" b="1" dirty="0"/>
+            </a:p>
+          </p:txBody>
+        </p:sp>
+        <p:sp>
+          <p:nvSpPr>
+            <p:cNvPr id="73" name="TextBox 72"/>
+            <p:cNvSpPr txBox="1"/>
+            <p:nvPr/>
+          </p:nvSpPr>
+          <p:spPr>
+            <a:xfrm>
+              <a:off x="6450292" y="3099339"/>
+              <a:ext cx="441146" cy="276999"/>
+            </a:xfrm>
+            <a:prstGeom prst="rect">
+              <a:avLst/>
+            </a:prstGeom>
+            <a:noFill/>
+          </p:spPr>
+          <p:txBody>
+            <a:bodyPr wrap="none" rtlCol="0">
+              <a:spAutoFit/>
+            </a:bodyPr>
+            <a:lstStyle/>
+            <a:p>
+              <a:r>
+                <a:rPr lang="en-US" sz="1200" b="1" dirty="0" smtClean="0"/>
+                <a:t>N=6</a:t>
+              </a:r>
+              <a:endParaRPr lang="en-US" sz="1200" b="1" dirty="0"/>
+            </a:p>
+          </p:txBody>
+        </p:sp>
+      </p:grpSp>
+      <p:grpSp>
+        <p:nvGrpSpPr>
+          <p:cNvPr id="78" name="Group 77"/>
+          <p:cNvGrpSpPr/>
+          <p:nvPr/>
+        </p:nvGrpSpPr>
+        <p:grpSpPr>
+          <a:xfrm>
+            <a:off x="2671316" y="4798365"/>
+            <a:ext cx="6414596" cy="1770095"/>
+            <a:chOff x="2671316" y="4798365"/>
+            <a:chExt cx="6414596" cy="1770095"/>
+          </a:xfrm>
+        </p:grpSpPr>
+        <p:sp>
+          <p:nvSpPr>
+            <p:cNvPr id="35" name="Oval 34">
+              <a:extLst>
+                <a:ext uri="{FF2B5EF4-FFF2-40B4-BE49-F238E27FC236}">
+                  <a16:creationId xmlns:a16="http://schemas.microsoft.com/office/drawing/2014/main" id="{C7CA7E8B-A0EF-424D-977E-A06A75DE837D}"/>
+                </a:ext>
+              </a:extLst>
+            </p:cNvPr>
+            <p:cNvSpPr/>
+            <p:nvPr/>
+          </p:nvSpPr>
+          <p:spPr>
+            <a:xfrm>
+              <a:off x="3161423" y="5564077"/>
+              <a:ext cx="406400" cy="406400"/>
+            </a:xfrm>
+            <a:prstGeom prst="ellipse">
+              <a:avLst/>
+            </a:prstGeom>
+            <a:solidFill>
+              <a:schemeClr val="bg1">
+                <a:lumMod val="65000"/>
+              </a:schemeClr>
+            </a:solidFill>
+            <a:ln>
+              <a:noFill/>
+            </a:ln>
+          </p:spPr>
+          <p:style>
+            <a:lnRef idx="2">
+              <a:schemeClr val="accent1">
+                <a:shade val="50000"/>
+              </a:schemeClr>
+            </a:lnRef>
+            <a:fillRef idx="1">
+              <a:schemeClr val="accent1"/>
+            </a:fillRef>
+            <a:effectRef idx="0">
+              <a:schemeClr val="accent1"/>
+            </a:effectRef>
+            <a:fontRef idx="minor">
+              <a:schemeClr val="lt1"/>
+            </a:fontRef>
+          </p:style>
+          <p:txBody>
+            <a:bodyPr rtlCol="0" anchor="ctr"/>
+            <a:lstStyle/>
+            <a:p>
+              <a:pPr algn="ctr"/>
+              <a:endParaRPr lang="en-DE"/>
+            </a:p>
+          </p:txBody>
+        </p:sp>
+        <p:sp>
+          <p:nvSpPr>
+            <p:cNvPr id="36" name="Oval 35">
+              <a:extLst>
+                <a:ext uri="{FF2B5EF4-FFF2-40B4-BE49-F238E27FC236}">
+                  <a16:creationId xmlns:a16="http://schemas.microsoft.com/office/drawing/2014/main" id="{D42037DF-EE40-A748-B850-E38A24E22E82}"/>
+                </a:ext>
+              </a:extLst>
+            </p:cNvPr>
+            <p:cNvSpPr/>
+            <p:nvPr/>
+          </p:nvSpPr>
+          <p:spPr>
+            <a:xfrm>
+              <a:off x="3946001" y="5564077"/>
+              <a:ext cx="406400" cy="406400"/>
+            </a:xfrm>
+            <a:prstGeom prst="ellipse">
+              <a:avLst/>
+            </a:prstGeom>
+            <a:solidFill>
+              <a:schemeClr val="bg1">
+                <a:lumMod val="65000"/>
+              </a:schemeClr>
+            </a:solidFill>
+            <a:ln>
+              <a:noFill/>
+            </a:ln>
+          </p:spPr>
+          <p:style>
+            <a:lnRef idx="2">
+              <a:schemeClr val="accent1">
+                <a:shade val="50000"/>
+              </a:schemeClr>
+            </a:lnRef>
+            <a:fillRef idx="1">
+              <a:schemeClr val="accent1"/>
+            </a:fillRef>
+            <a:effectRef idx="0">
+              <a:schemeClr val="accent1"/>
+            </a:effectRef>
+            <a:fontRef idx="minor">
+              <a:schemeClr val="lt1"/>
+            </a:fontRef>
+          </p:style>
+          <p:txBody>
+            <a:bodyPr rtlCol="0" anchor="ctr"/>
+            <a:lstStyle/>
+            <a:p>
+              <a:pPr algn="ctr"/>
+              <a:endParaRPr lang="en-DE"/>
+            </a:p>
+          </p:txBody>
+        </p:sp>
+        <p:sp>
+          <p:nvSpPr>
+            <p:cNvPr id="37" name="Oval 36">
+              <a:extLst>
+                <a:ext uri="{FF2B5EF4-FFF2-40B4-BE49-F238E27FC236}">
+                  <a16:creationId xmlns:a16="http://schemas.microsoft.com/office/drawing/2014/main" id="{6BFA0615-4A31-F049-87FF-2B9688FC0CEC}"/>
+                </a:ext>
+              </a:extLst>
+            </p:cNvPr>
+            <p:cNvSpPr/>
+            <p:nvPr/>
+          </p:nvSpPr>
+          <p:spPr>
+            <a:xfrm>
+              <a:off x="4736223" y="5564077"/>
+              <a:ext cx="406400" cy="406400"/>
+            </a:xfrm>
+            <a:prstGeom prst="ellipse">
+              <a:avLst/>
+            </a:prstGeom>
+            <a:solidFill>
+              <a:schemeClr val="bg1">
+                <a:lumMod val="65000"/>
+              </a:schemeClr>
+            </a:solidFill>
+            <a:ln>
+              <a:noFill/>
+            </a:ln>
+          </p:spPr>
+          <p:style>
+            <a:lnRef idx="2">
+              <a:schemeClr val="accent1">
+                <a:shade val="50000"/>
+              </a:schemeClr>
+            </a:lnRef>
+            <a:fillRef idx="1">
+              <a:schemeClr val="accent1"/>
+            </a:fillRef>
+            <a:effectRef idx="0">
+              <a:schemeClr val="accent1"/>
+            </a:effectRef>
+            <a:fontRef idx="minor">
+              <a:schemeClr val="lt1"/>
+            </a:fontRef>
+          </p:style>
+          <p:txBody>
+            <a:bodyPr rtlCol="0" anchor="ctr"/>
+            <a:lstStyle/>
+            <a:p>
+              <a:pPr algn="ctr"/>
+              <a:endParaRPr lang="en-DE"/>
+            </a:p>
+          </p:txBody>
+        </p:sp>
+        <p:sp>
+          <p:nvSpPr>
+            <p:cNvPr id="38" name="Oval 37">
+              <a:extLst>
+                <a:ext uri="{FF2B5EF4-FFF2-40B4-BE49-F238E27FC236}">
+                  <a16:creationId xmlns:a16="http://schemas.microsoft.com/office/drawing/2014/main" id="{19CB9FEA-CECC-4141-AD42-68740712D151}"/>
+                </a:ext>
+              </a:extLst>
+            </p:cNvPr>
+            <p:cNvSpPr/>
+            <p:nvPr/>
+          </p:nvSpPr>
+          <p:spPr>
+            <a:xfrm>
+              <a:off x="5526445" y="5564077"/>
+              <a:ext cx="406400" cy="406400"/>
+            </a:xfrm>
+            <a:prstGeom prst="ellipse">
+              <a:avLst/>
+            </a:prstGeom>
+            <a:solidFill>
+              <a:schemeClr val="bg1">
+                <a:lumMod val="65000"/>
+              </a:schemeClr>
+            </a:solidFill>
+            <a:ln>
+              <a:noFill/>
+            </a:ln>
+          </p:spPr>
+          <p:style>
+            <a:lnRef idx="2">
+              <a:schemeClr val="accent1">
+                <a:shade val="50000"/>
+              </a:schemeClr>
+            </a:lnRef>
+            <a:fillRef idx="1">
+              <a:schemeClr val="accent1"/>
+            </a:fillRef>
+            <a:effectRef idx="0">
+              <a:schemeClr val="accent1"/>
+            </a:effectRef>
+            <a:fontRef idx="minor">
+              <a:schemeClr val="lt1"/>
+            </a:fontRef>
+          </p:style>
+          <p:txBody>
+            <a:bodyPr rtlCol="0" anchor="ctr"/>
+            <a:lstStyle/>
+            <a:p>
+              <a:pPr algn="ctr"/>
+              <a:endParaRPr lang="en-DE"/>
+            </a:p>
+          </p:txBody>
+        </p:sp>
+        <p:sp>
+          <p:nvSpPr>
+            <p:cNvPr id="39" name="Oval 38">
+              <a:extLst>
+                <a:ext uri="{FF2B5EF4-FFF2-40B4-BE49-F238E27FC236}">
+                  <a16:creationId xmlns:a16="http://schemas.microsoft.com/office/drawing/2014/main" id="{6BFA0615-4A31-F049-87FF-2B9688FC0CEC}"/>
+                </a:ext>
+              </a:extLst>
+            </p:cNvPr>
+            <p:cNvSpPr/>
+            <p:nvPr/>
+          </p:nvSpPr>
+          <p:spPr>
+            <a:xfrm>
+              <a:off x="6316667" y="5575111"/>
+              <a:ext cx="406400" cy="406400"/>
+            </a:xfrm>
+            <a:prstGeom prst="ellipse">
+              <a:avLst/>
+            </a:prstGeom>
+            <a:solidFill>
+              <a:schemeClr val="bg1">
+                <a:lumMod val="65000"/>
+              </a:schemeClr>
+            </a:solidFill>
+            <a:ln>
+              <a:noFill/>
+            </a:ln>
+          </p:spPr>
+          <p:style>
+            <a:lnRef idx="2">
+              <a:schemeClr val="accent1">
+                <a:shade val="50000"/>
+              </a:schemeClr>
+            </a:lnRef>
+            <a:fillRef idx="1">
+              <a:schemeClr val="accent1"/>
+            </a:fillRef>
+            <a:effectRef idx="0">
+              <a:schemeClr val="accent1"/>
+            </a:effectRef>
+            <a:fontRef idx="minor">
+              <a:schemeClr val="lt1"/>
+            </a:fontRef>
+          </p:style>
+          <p:txBody>
+            <a:bodyPr rtlCol="0" anchor="ctr"/>
+            <a:lstStyle/>
+            <a:p>
+              <a:pPr algn="ctr"/>
+              <a:endParaRPr lang="en-DE"/>
+            </a:p>
+          </p:txBody>
+        </p:sp>
+        <p:sp>
+          <p:nvSpPr>
+            <p:cNvPr id="40" name="Oval 39">
+              <a:extLst>
+                <a:ext uri="{FF2B5EF4-FFF2-40B4-BE49-F238E27FC236}">
+                  <a16:creationId xmlns:a16="http://schemas.microsoft.com/office/drawing/2014/main" id="{19CB9FEA-CECC-4141-AD42-68740712D151}"/>
+                </a:ext>
+              </a:extLst>
+            </p:cNvPr>
+            <p:cNvSpPr/>
+            <p:nvPr/>
+          </p:nvSpPr>
+          <p:spPr>
+            <a:xfrm>
+              <a:off x="7106889" y="5575111"/>
+              <a:ext cx="406400" cy="406400"/>
+            </a:xfrm>
+            <a:prstGeom prst="ellipse">
+              <a:avLst/>
+            </a:prstGeom>
+            <a:solidFill>
+              <a:schemeClr val="bg1">
+                <a:lumMod val="65000"/>
+              </a:schemeClr>
+            </a:solidFill>
+            <a:ln>
+              <a:noFill/>
+            </a:ln>
+          </p:spPr>
+          <p:style>
+            <a:lnRef idx="2">
+              <a:schemeClr val="accent1">
+                <a:shade val="50000"/>
+              </a:schemeClr>
+            </a:lnRef>
+            <a:fillRef idx="1">
+              <a:schemeClr val="accent1"/>
+            </a:fillRef>
+            <a:effectRef idx="0">
+              <a:schemeClr val="accent1"/>
+            </a:effectRef>
+            <a:fontRef idx="minor">
+              <a:schemeClr val="lt1"/>
+            </a:fontRef>
+          </p:style>
+          <p:txBody>
+            <a:bodyPr rtlCol="0" anchor="ctr"/>
+            <a:lstStyle/>
+            <a:p>
+              <a:pPr algn="ctr"/>
+              <a:endParaRPr lang="en-DE"/>
+            </a:p>
+          </p:txBody>
+        </p:sp>
+        <p:sp>
+          <p:nvSpPr>
+            <p:cNvPr id="41" name="TextBox 40"/>
+            <p:cNvSpPr txBox="1"/>
+            <p:nvPr/>
+          </p:nvSpPr>
+          <p:spPr>
+            <a:xfrm>
+              <a:off x="3213780" y="5593645"/>
+              <a:ext cx="301686" cy="369332"/>
+            </a:xfrm>
+            <a:prstGeom prst="rect">
+              <a:avLst/>
+            </a:prstGeom>
+            <a:noFill/>
+          </p:spPr>
+          <p:txBody>
+            <a:bodyPr wrap="none" rtlCol="0">
+              <a:spAutoFit/>
+            </a:bodyPr>
+            <a:lstStyle/>
+            <a:p>
+              <a:r>
+                <a:rPr lang="en-US" dirty="0" smtClean="0"/>
+                <a:t>0</a:t>
+              </a:r>
+              <a:endParaRPr lang="en-US" dirty="0"/>
+            </a:p>
+          </p:txBody>
+        </p:sp>
+        <p:sp>
+          <p:nvSpPr>
+            <p:cNvPr id="42" name="TextBox 41"/>
+            <p:cNvSpPr txBox="1"/>
+            <p:nvPr/>
+          </p:nvSpPr>
+          <p:spPr>
+            <a:xfrm>
+              <a:off x="3998358" y="5582611"/>
+              <a:ext cx="301686" cy="369332"/>
+            </a:xfrm>
+            <a:prstGeom prst="rect">
+              <a:avLst/>
+            </a:prstGeom>
+            <a:noFill/>
+          </p:spPr>
+          <p:txBody>
+            <a:bodyPr wrap="none" rtlCol="0">
+              <a:spAutoFit/>
+            </a:bodyPr>
+            <a:lstStyle/>
+            <a:p>
+              <a:r>
+                <a:rPr lang="en-US" dirty="0" smtClean="0"/>
+                <a:t>1</a:t>
+              </a:r>
+              <a:endParaRPr lang="en-US" dirty="0"/>
+            </a:p>
+          </p:txBody>
+        </p:sp>
+        <p:sp>
+          <p:nvSpPr>
+            <p:cNvPr id="43" name="TextBox 42"/>
+            <p:cNvSpPr txBox="1"/>
+            <p:nvPr/>
+          </p:nvSpPr>
+          <p:spPr>
+            <a:xfrm>
+              <a:off x="4791976" y="5575111"/>
+              <a:ext cx="301686" cy="369332"/>
+            </a:xfrm>
+            <a:prstGeom prst="rect">
+              <a:avLst/>
+            </a:prstGeom>
+            <a:noFill/>
+          </p:spPr>
+          <p:txBody>
+            <a:bodyPr wrap="none" rtlCol="0">
+              <a:spAutoFit/>
+            </a:bodyPr>
+            <a:lstStyle/>
+            <a:p>
+              <a:r>
+                <a:rPr lang="en-US" dirty="0" smtClean="0"/>
+                <a:t>2</a:t>
+              </a:r>
+              <a:endParaRPr lang="en-US" dirty="0"/>
+            </a:p>
+          </p:txBody>
+        </p:sp>
+        <p:sp>
+          <p:nvSpPr>
+            <p:cNvPr id="44" name="TextBox 43"/>
+            <p:cNvSpPr txBox="1"/>
+            <p:nvPr/>
+          </p:nvSpPr>
+          <p:spPr>
+            <a:xfrm>
+              <a:off x="5578802" y="5575111"/>
+              <a:ext cx="301686" cy="369332"/>
+            </a:xfrm>
+            <a:prstGeom prst="rect">
+              <a:avLst/>
+            </a:prstGeom>
+            <a:noFill/>
+          </p:spPr>
+          <p:txBody>
+            <a:bodyPr wrap="none" rtlCol="0">
+              <a:spAutoFit/>
+            </a:bodyPr>
+            <a:lstStyle/>
+            <a:p>
+              <a:r>
+                <a:rPr lang="en-US" dirty="0" smtClean="0"/>
+                <a:t>3</a:t>
+              </a:r>
+              <a:endParaRPr lang="en-US" dirty="0"/>
+            </a:p>
+          </p:txBody>
+        </p:sp>
+        <p:sp>
+          <p:nvSpPr>
+            <p:cNvPr id="45" name="TextBox 44"/>
+            <p:cNvSpPr txBox="1"/>
+            <p:nvPr/>
+          </p:nvSpPr>
+          <p:spPr>
+            <a:xfrm>
+              <a:off x="6363746" y="5593645"/>
+              <a:ext cx="301686" cy="369332"/>
+            </a:xfrm>
+            <a:prstGeom prst="rect">
+              <a:avLst/>
+            </a:prstGeom>
+            <a:noFill/>
+          </p:spPr>
+          <p:txBody>
+            <a:bodyPr wrap="none" rtlCol="0">
+              <a:spAutoFit/>
+            </a:bodyPr>
+            <a:lstStyle/>
+            <a:p>
+              <a:r>
+                <a:rPr lang="en-US" dirty="0" smtClean="0"/>
+                <a:t>4</a:t>
+              </a:r>
+              <a:endParaRPr lang="en-US" dirty="0"/>
+            </a:p>
+          </p:txBody>
+        </p:sp>
+        <p:sp>
+          <p:nvSpPr>
+            <p:cNvPr id="46" name="TextBox 45"/>
+            <p:cNvSpPr txBox="1"/>
+            <p:nvPr/>
+          </p:nvSpPr>
+          <p:spPr>
+            <a:xfrm>
+              <a:off x="7159246" y="5582611"/>
+              <a:ext cx="301686" cy="369332"/>
+            </a:xfrm>
+            <a:prstGeom prst="rect">
+              <a:avLst/>
+            </a:prstGeom>
+            <a:noFill/>
+          </p:spPr>
+          <p:txBody>
+            <a:bodyPr wrap="none" rtlCol="0">
+              <a:spAutoFit/>
+            </a:bodyPr>
+            <a:lstStyle/>
+            <a:p>
+              <a:r>
+                <a:rPr lang="en-US" dirty="0" smtClean="0"/>
+                <a:t>5</a:t>
+              </a:r>
+              <a:endParaRPr lang="en-US" dirty="0"/>
+            </a:p>
+          </p:txBody>
+        </p:sp>
+        <p:sp>
+          <p:nvSpPr>
+            <p:cNvPr id="47" name="Right Brace 46"/>
+            <p:cNvSpPr/>
+            <p:nvPr/>
+          </p:nvSpPr>
+          <p:spPr>
+            <a:xfrm rot="5400000">
+              <a:off x="6079496" y="5751773"/>
+              <a:ext cx="194390" cy="825390"/>
+            </a:xfrm>
+            <a:prstGeom prst="rightBrace">
+              <a:avLst>
+                <a:gd name="adj1" fmla="val 36253"/>
+                <a:gd name="adj2" fmla="val 50000"/>
+              </a:avLst>
+            </a:prstGeom>
+          </p:spPr>
+          <p:style>
+            <a:lnRef idx="1">
+              <a:schemeClr val="accent1"/>
+            </a:lnRef>
+            <a:fillRef idx="0">
+              <a:schemeClr val="accent1"/>
+            </a:fillRef>
+            <a:effectRef idx="0">
+              <a:schemeClr val="accent1"/>
+            </a:effectRef>
+            <a:fontRef idx="minor">
+              <a:schemeClr val="tx1"/>
+            </a:fontRef>
+          </p:style>
+          <p:txBody>
+            <a:bodyPr rtlCol="0" anchor="ctr"/>
+            <a:lstStyle/>
+            <a:p>
+              <a:pPr algn="ctr"/>
+              <a:endParaRPr lang="en-US"/>
+            </a:p>
+          </p:txBody>
+        </p:sp>
+        <p:sp>
+          <p:nvSpPr>
+            <p:cNvPr id="48" name="TextBox 47"/>
+            <p:cNvSpPr txBox="1"/>
+            <p:nvPr/>
+          </p:nvSpPr>
+          <p:spPr>
+            <a:xfrm>
+              <a:off x="5738575" y="6291461"/>
+              <a:ext cx="926857" cy="276999"/>
+            </a:xfrm>
+            <a:prstGeom prst="rect">
+              <a:avLst/>
+            </a:prstGeom>
+            <a:noFill/>
+          </p:spPr>
+          <p:txBody>
+            <a:bodyPr wrap="none" rtlCol="0">
+              <a:spAutoFit/>
+            </a:bodyPr>
+            <a:lstStyle/>
+            <a:p>
+              <a:r>
+                <a:rPr lang="en-US" sz="1200" b="1" dirty="0" smtClean="0"/>
+                <a:t>Middle pair</a:t>
+              </a:r>
+              <a:endParaRPr lang="en-US" sz="1200" b="1" dirty="0"/>
+            </a:p>
+          </p:txBody>
+        </p:sp>
+        <p:sp>
+          <p:nvSpPr>
+            <p:cNvPr id="49" name="Right Brace 48"/>
+            <p:cNvSpPr/>
+            <p:nvPr/>
+          </p:nvSpPr>
+          <p:spPr>
+            <a:xfrm rot="16200000">
+              <a:off x="5950102" y="3330937"/>
+              <a:ext cx="350392" cy="3926479"/>
+            </a:xfrm>
+            <a:prstGeom prst="rightBrace">
+              <a:avLst/>
+            </a:prstGeom>
+          </p:spPr>
+          <p:style>
+            <a:lnRef idx="1">
+              <a:schemeClr val="accent1"/>
+            </a:lnRef>
+            <a:fillRef idx="0">
+              <a:schemeClr val="accent1"/>
+            </a:fillRef>
+            <a:effectRef idx="0">
+              <a:schemeClr val="accent1"/>
+            </a:effectRef>
+            <a:fontRef idx="minor">
+              <a:schemeClr val="tx1"/>
+            </a:fontRef>
+          </p:style>
+          <p:txBody>
+            <a:bodyPr rtlCol="0" anchor="ctr"/>
+            <a:lstStyle/>
+            <a:p>
+              <a:pPr algn="ctr"/>
+              <a:endParaRPr lang="en-US"/>
+            </a:p>
+          </p:txBody>
+        </p:sp>
+        <p:sp>
+          <p:nvSpPr>
+            <p:cNvPr id="50" name="TextBox 49"/>
+            <p:cNvSpPr txBox="1"/>
+            <p:nvPr/>
+          </p:nvSpPr>
+          <p:spPr>
+            <a:xfrm>
+              <a:off x="5547401" y="4798365"/>
+              <a:ext cx="1128579" cy="276999"/>
+            </a:xfrm>
+            <a:prstGeom prst="rect">
+              <a:avLst/>
+            </a:prstGeom>
+            <a:noFill/>
+          </p:spPr>
+          <p:txBody>
+            <a:bodyPr wrap="none" rtlCol="0">
+              <a:spAutoFit/>
+            </a:bodyPr>
+            <a:lstStyle/>
+            <a:p>
+              <a:r>
+                <a:rPr lang="en-US" sz="1200" b="1" dirty="0" smtClean="0"/>
+                <a:t>Projection pair</a:t>
+              </a:r>
+              <a:endParaRPr lang="en-US" sz="1200" b="1" dirty="0"/>
+            </a:p>
+          </p:txBody>
+        </p:sp>
+        <p:sp>
+          <p:nvSpPr>
+            <p:cNvPr id="51" name="Oval 50">
+              <a:extLst>
+                <a:ext uri="{FF2B5EF4-FFF2-40B4-BE49-F238E27FC236}">
+                  <a16:creationId xmlns:a16="http://schemas.microsoft.com/office/drawing/2014/main" id="{19CB9FEA-CECC-4141-AD42-68740712D151}"/>
+                </a:ext>
+              </a:extLst>
+            </p:cNvPr>
+            <p:cNvSpPr/>
+            <p:nvPr/>
+          </p:nvSpPr>
+          <p:spPr>
+            <a:xfrm>
+              <a:off x="7879216" y="5567611"/>
+              <a:ext cx="406400" cy="406400"/>
+            </a:xfrm>
+            <a:prstGeom prst="ellipse">
+              <a:avLst/>
+            </a:prstGeom>
+            <a:solidFill>
+              <a:schemeClr val="bg1">
+                <a:lumMod val="65000"/>
+              </a:schemeClr>
+            </a:solidFill>
+            <a:ln>
+              <a:noFill/>
+            </a:ln>
+          </p:spPr>
+          <p:style>
+            <a:lnRef idx="2">
+              <a:schemeClr val="accent1">
+                <a:shade val="50000"/>
+              </a:schemeClr>
+            </a:lnRef>
+            <a:fillRef idx="1">
+              <a:schemeClr val="accent1"/>
+            </a:fillRef>
+            <a:effectRef idx="0">
+              <a:schemeClr val="accent1"/>
+            </a:effectRef>
+            <a:fontRef idx="minor">
+              <a:schemeClr val="lt1"/>
+            </a:fontRef>
+          </p:style>
+          <p:txBody>
+            <a:bodyPr rtlCol="0" anchor="ctr"/>
+            <a:lstStyle/>
+            <a:p>
+              <a:pPr algn="ctr"/>
+              <a:endParaRPr lang="en-DE"/>
+            </a:p>
+          </p:txBody>
+        </p:sp>
+        <p:sp>
+          <p:nvSpPr>
+            <p:cNvPr id="52" name="TextBox 51"/>
+            <p:cNvSpPr txBox="1"/>
+            <p:nvPr/>
+          </p:nvSpPr>
+          <p:spPr>
+            <a:xfrm>
+              <a:off x="7931573" y="5575111"/>
+              <a:ext cx="301686" cy="369332"/>
+            </a:xfrm>
+            <a:prstGeom prst="rect">
+              <a:avLst/>
+            </a:prstGeom>
+            <a:noFill/>
+          </p:spPr>
+          <p:txBody>
+            <a:bodyPr wrap="none" rtlCol="0">
+              <a:spAutoFit/>
+            </a:bodyPr>
+            <a:lstStyle/>
+            <a:p>
+              <a:r>
+                <a:rPr lang="en-US" dirty="0" smtClean="0"/>
+                <a:t>6</a:t>
+              </a:r>
+              <a:endParaRPr lang="en-US" dirty="0"/>
+            </a:p>
+          </p:txBody>
+        </p:sp>
+        <p:sp>
+          <p:nvSpPr>
+            <p:cNvPr id="53" name="Oval 52">
+              <a:extLst>
+                <a:ext uri="{FF2B5EF4-FFF2-40B4-BE49-F238E27FC236}">
+                  <a16:creationId xmlns:a16="http://schemas.microsoft.com/office/drawing/2014/main" id="{19CB9FEA-CECC-4141-AD42-68740712D151}"/>
+                </a:ext>
+              </a:extLst>
+            </p:cNvPr>
+            <p:cNvSpPr/>
+            <p:nvPr/>
+          </p:nvSpPr>
+          <p:spPr>
+            <a:xfrm>
+              <a:off x="8679512" y="5567611"/>
+              <a:ext cx="406400" cy="406400"/>
+            </a:xfrm>
+            <a:prstGeom prst="ellipse">
+              <a:avLst/>
+            </a:prstGeom>
+            <a:solidFill>
+              <a:schemeClr val="bg1">
+                <a:lumMod val="65000"/>
+              </a:schemeClr>
+            </a:solidFill>
+            <a:ln>
+              <a:noFill/>
+            </a:ln>
+          </p:spPr>
+          <p:style>
+            <a:lnRef idx="2">
+              <a:schemeClr val="accent1">
+                <a:shade val="50000"/>
+              </a:schemeClr>
+            </a:lnRef>
+            <a:fillRef idx="1">
+              <a:schemeClr val="accent1"/>
+            </a:fillRef>
+            <a:effectRef idx="0">
+              <a:schemeClr val="accent1"/>
+            </a:effectRef>
+            <a:fontRef idx="minor">
+              <a:schemeClr val="lt1"/>
+            </a:fontRef>
+          </p:style>
+          <p:txBody>
+            <a:bodyPr rtlCol="0" anchor="ctr"/>
+            <a:lstStyle/>
+            <a:p>
+              <a:pPr algn="ctr"/>
+              <a:endParaRPr lang="en-DE"/>
+            </a:p>
+          </p:txBody>
+        </p:sp>
+        <p:sp>
+          <p:nvSpPr>
+            <p:cNvPr id="54" name="TextBox 53"/>
+            <p:cNvSpPr txBox="1"/>
+            <p:nvPr/>
+          </p:nvSpPr>
+          <p:spPr>
+            <a:xfrm>
+              <a:off x="8731869" y="5575111"/>
+              <a:ext cx="301686" cy="369332"/>
+            </a:xfrm>
+            <a:prstGeom prst="rect">
+              <a:avLst/>
+            </a:prstGeom>
+            <a:noFill/>
+          </p:spPr>
+          <p:txBody>
+            <a:bodyPr wrap="none" rtlCol="0">
+              <a:spAutoFit/>
+            </a:bodyPr>
+            <a:lstStyle/>
+            <a:p>
+              <a:r>
+                <a:rPr lang="en-US" dirty="0" smtClean="0"/>
+                <a:t>7</a:t>
+              </a:r>
+              <a:endParaRPr lang="en-US" dirty="0"/>
+            </a:p>
+          </p:txBody>
+        </p:sp>
+        <p:sp>
+          <p:nvSpPr>
+            <p:cNvPr id="74" name="TextBox 73"/>
+            <p:cNvSpPr txBox="1"/>
+            <p:nvPr/>
+          </p:nvSpPr>
+          <p:spPr>
+            <a:xfrm>
+              <a:off x="2671316" y="5639811"/>
+              <a:ext cx="441146" cy="276999"/>
+            </a:xfrm>
+            <a:prstGeom prst="rect">
+              <a:avLst/>
+            </a:prstGeom>
+            <a:noFill/>
+          </p:spPr>
+          <p:txBody>
+            <a:bodyPr wrap="none" rtlCol="0">
+              <a:spAutoFit/>
+            </a:bodyPr>
+            <a:lstStyle/>
+            <a:p>
+              <a:r>
+                <a:rPr lang="en-US" sz="1200" b="1" dirty="0" smtClean="0"/>
+                <a:t>N=8</a:t>
+              </a:r>
+              <a:endParaRPr lang="en-US" sz="1200" b="1" dirty="0"/>
+            </a:p>
+          </p:txBody>
+        </p:sp>
+      </p:grpSp>
+    </p:spTree>
+    <p:extLst>
+      <p:ext uri="{BB962C8B-B14F-4D97-AF65-F5344CB8AC3E}">
+        <p14:creationId xmlns:p14="http://schemas.microsoft.com/office/powerpoint/2010/main" val="28088496"/>
       </p:ext>
     </p:extLst>
   </p:cSld>

</xml_diff>